<commit_message>
Updating Sessions 7 & 8
</commit_message>
<xml_diff>
--- a/session_seven/session_seven_presentation.pptx
+++ b/session_seven/session_seven_presentation.pptx
@@ -8,32 +8,31 @@
     <p:sldMasterId id="2147483656" r:id="rId8"/>
   </p:sldMasterIdLst>
   <p:notesMasterIdLst>
-    <p:notesMasterId r:id="rId24"/>
+    <p:notesMasterId r:id="rId23"/>
   </p:notesMasterIdLst>
   <p:handoutMasterIdLst>
-    <p:handoutMasterId r:id="rId25"/>
+    <p:handoutMasterId r:id="rId24"/>
   </p:handoutMasterIdLst>
   <p:sldIdLst>
     <p:sldId id="386" r:id="rId9"/>
     <p:sldId id="425" r:id="rId10"/>
     <p:sldId id="439" r:id="rId11"/>
     <p:sldId id="464" r:id="rId12"/>
-    <p:sldId id="468" r:id="rId13"/>
-    <p:sldId id="465" r:id="rId14"/>
-    <p:sldId id="466" r:id="rId15"/>
-    <p:sldId id="470" r:id="rId16"/>
-    <p:sldId id="467" r:id="rId17"/>
-    <p:sldId id="469" r:id="rId18"/>
-    <p:sldId id="471" r:id="rId19"/>
-    <p:sldId id="472" r:id="rId20"/>
-    <p:sldId id="473" r:id="rId21"/>
-    <p:sldId id="474" r:id="rId22"/>
-    <p:sldId id="475" r:id="rId23"/>
+    <p:sldId id="465" r:id="rId13"/>
+    <p:sldId id="466" r:id="rId14"/>
+    <p:sldId id="470" r:id="rId15"/>
+    <p:sldId id="467" r:id="rId16"/>
+    <p:sldId id="469" r:id="rId17"/>
+    <p:sldId id="471" r:id="rId18"/>
+    <p:sldId id="472" r:id="rId19"/>
+    <p:sldId id="473" r:id="rId20"/>
+    <p:sldId id="474" r:id="rId21"/>
+    <p:sldId id="475" r:id="rId22"/>
   </p:sldIdLst>
   <p:sldSz cx="9144000" cy="5143500" type="screen16x9"/>
   <p:notesSz cx="6670675" cy="9875838"/>
   <p:custDataLst>
-    <p:tags r:id="rId26"/>
+    <p:tags r:id="rId25"/>
   </p:custDataLst>
   <p:defaultTextStyle>
     <a:defPPr>
@@ -168,18 +167,79 @@
 </p:presentation>
 </file>
 
-<file path=ppt/revisionInfo.xml><?xml version="1.0" encoding="utf-8"?>
-<p1510:revInfo xmlns:a="http://schemas.openxmlformats.org/drawingml/2006/main" xmlns:r="http://schemas.openxmlformats.org/officeDocument/2006/relationships" xmlns:p1510="http://schemas.microsoft.com/office/powerpoint/2015/10/main">
-  <p1510:revLst>
-    <p1510:client id="{2BB45DB9-A5C7-42D9-8D86-58E9C0F106AD}" v="4" dt="2020-03-26T12:03:13.542"/>
-    <p1510:client id="{9769029B-DAE8-4543-A14E-8C5695AE6F3B}" v="252" dt="2020-03-26T09:57:15.391"/>
-    <p1510:client id="{FEAF9D15-8916-46E4-AA42-74602A5A02FF}" v="129" dt="2020-03-26T11:53:18.451"/>
-  </p1510:revLst>
-</p1510:revInfo>
-</file>
-
 <file path=ppt/changesInfos/changesInfo1.xml><?xml version="1.0" encoding="utf-8"?>
 <pc:chgInfo xmlns:a="http://schemas.openxmlformats.org/drawingml/2006/main" xmlns:r="http://schemas.openxmlformats.org/officeDocument/2006/relationships" xmlns:ac="http://schemas.microsoft.com/office/drawing/2013/main/command" xmlns:pc="http://schemas.microsoft.com/office/powerpoint/2013/main/command">
+  <pc:docChgLst>
+    <pc:chgData name="Porter, Mark" userId="b07d94d0-d1a4-45e8-be22-2181e9252090" providerId="ADAL" clId="{65621585-4068-4507-ADB2-E8BCAAB9A415}"/>
+    <pc:docChg chg="delSld modSld">
+      <pc:chgData name="Porter, Mark" userId="b07d94d0-d1a4-45e8-be22-2181e9252090" providerId="ADAL" clId="{65621585-4068-4507-ADB2-E8BCAAB9A415}" dt="2021-03-11T11:00:51.832" v="72" actId="2696"/>
+      <pc:docMkLst>
+        <pc:docMk/>
+      </pc:docMkLst>
+      <pc:sldChg chg="modSp mod">
+        <pc:chgData name="Porter, Mark" userId="b07d94d0-d1a4-45e8-be22-2181e9252090" providerId="ADAL" clId="{65621585-4068-4507-ADB2-E8BCAAB9A415}" dt="2021-03-11T11:00:18.232" v="71" actId="1076"/>
+        <pc:sldMkLst>
+          <pc:docMk/>
+          <pc:sldMk cId="3596002856" sldId="464"/>
+        </pc:sldMkLst>
+        <pc:spChg chg="mod">
+          <ac:chgData name="Porter, Mark" userId="b07d94d0-d1a4-45e8-be22-2181e9252090" providerId="ADAL" clId="{65621585-4068-4507-ADB2-E8BCAAB9A415}" dt="2021-03-11T11:00:00.158" v="67" actId="20577"/>
+          <ac:spMkLst>
+            <pc:docMk/>
+            <pc:sldMk cId="3596002856" sldId="464"/>
+            <ac:spMk id="6" creationId="{28280EFD-605B-4843-8D20-931E34B69861}"/>
+          </ac:spMkLst>
+        </pc:spChg>
+        <pc:picChg chg="mod">
+          <ac:chgData name="Porter, Mark" userId="b07d94d0-d1a4-45e8-be22-2181e9252090" providerId="ADAL" clId="{65621585-4068-4507-ADB2-E8BCAAB9A415}" dt="2021-03-11T11:00:14.019" v="70" actId="1076"/>
+          <ac:picMkLst>
+            <pc:docMk/>
+            <pc:sldMk cId="3596002856" sldId="464"/>
+            <ac:picMk id="4" creationId="{975A6674-29EA-450C-8946-4B7DE6D73741}"/>
+          </ac:picMkLst>
+        </pc:picChg>
+        <pc:picChg chg="mod">
+          <ac:chgData name="Porter, Mark" userId="b07d94d0-d1a4-45e8-be22-2181e9252090" providerId="ADAL" clId="{65621585-4068-4507-ADB2-E8BCAAB9A415}" dt="2021-03-11T11:00:18.232" v="71" actId="1076"/>
+          <ac:picMkLst>
+            <pc:docMk/>
+            <pc:sldMk cId="3596002856" sldId="464"/>
+            <ac:picMk id="7" creationId="{8584CB31-57CC-4EBA-B002-7D9A47FBBFB8}"/>
+          </ac:picMkLst>
+        </pc:picChg>
+      </pc:sldChg>
+      <pc:sldChg chg="del">
+        <pc:chgData name="Porter, Mark" userId="b07d94d0-d1a4-45e8-be22-2181e9252090" providerId="ADAL" clId="{65621585-4068-4507-ADB2-E8BCAAB9A415}" dt="2021-03-11T11:00:51.832" v="72" actId="2696"/>
+        <pc:sldMkLst>
+          <pc:docMk/>
+          <pc:sldMk cId="904237300" sldId="468"/>
+        </pc:sldMkLst>
+      </pc:sldChg>
+    </pc:docChg>
+  </pc:docChgLst>
+  <pc:docChgLst>
+    <pc:chgData name="McKinney, David" userId="S::kqkh779@astrazeneca.net::8b945cb3-78ce-42d7-adc5-b07bab32cd5b" providerId="AD" clId="Web-{2BB45DB9-A5C7-42D9-8D86-58E9C0F106AD}"/>
+    <pc:docChg chg="modSld">
+      <pc:chgData name="McKinney, David" userId="S::kqkh779@astrazeneca.net::8b945cb3-78ce-42d7-adc5-b07bab32cd5b" providerId="AD" clId="Web-{2BB45DB9-A5C7-42D9-8D86-58E9C0F106AD}" dt="2020-03-26T12:03:13.542" v="3" actId="20577"/>
+      <pc:docMkLst>
+        <pc:docMk/>
+      </pc:docMkLst>
+      <pc:sldChg chg="modSp">
+        <pc:chgData name="McKinney, David" userId="S::kqkh779@astrazeneca.net::8b945cb3-78ce-42d7-adc5-b07bab32cd5b" providerId="AD" clId="Web-{2BB45DB9-A5C7-42D9-8D86-58E9C0F106AD}" dt="2020-03-26T12:03:13.542" v="3" actId="20577"/>
+        <pc:sldMkLst>
+          <pc:docMk/>
+          <pc:sldMk cId="2052954903" sldId="358"/>
+        </pc:sldMkLst>
+        <pc:spChg chg="mod">
+          <ac:chgData name="McKinney, David" userId="S::kqkh779@astrazeneca.net::8b945cb3-78ce-42d7-adc5-b07bab32cd5b" providerId="AD" clId="Web-{2BB45DB9-A5C7-42D9-8D86-58E9C0F106AD}" dt="2020-03-26T12:03:13.542" v="3" actId="20577"/>
+          <ac:spMkLst>
+            <pc:docMk/>
+            <pc:sldMk cId="2052954903" sldId="358"/>
+            <ac:spMk id="2" creationId="{C46CB304-3A01-0040-A35A-B50918C22C95}"/>
+          </ac:spMkLst>
+        </pc:spChg>
+      </pc:sldChg>
+    </pc:docChg>
+  </pc:docChgLst>
   <pc:docChgLst>
     <pc:chgData name="McKinney, David" userId="S::kqkh779@astrazeneca.net::8b945cb3-78ce-42d7-adc5-b07bab32cd5b" providerId="AD" clId="Web-{FEAF9D15-8916-46E4-AA42-74602A5A02FF}"/>
     <pc:docChg chg="addSld modSld sldOrd">
@@ -845,33 +905,6 @@
       </pc:sldChg>
     </pc:docChg>
   </pc:docChgLst>
-  <pc:docChgLst>
-    <pc:chgData name="Bradley, Sam" userId="f75c196c-0419-4ed7-9101-2e14ae32ff77" providerId="ADAL" clId="{3FF446AA-2460-4900-8B64-80B2BFB30CB0}"/>
-  </pc:docChgLst>
-  <pc:docChgLst>
-    <pc:chgData name="McKinney, David" userId="S::kqkh779@astrazeneca.net::8b945cb3-78ce-42d7-adc5-b07bab32cd5b" providerId="AD" clId="Web-{2BB45DB9-A5C7-42D9-8D86-58E9C0F106AD}"/>
-    <pc:docChg chg="modSld">
-      <pc:chgData name="McKinney, David" userId="S::kqkh779@astrazeneca.net::8b945cb3-78ce-42d7-adc5-b07bab32cd5b" providerId="AD" clId="Web-{2BB45DB9-A5C7-42D9-8D86-58E9C0F106AD}" dt="2020-03-26T12:03:13.542" v="3" actId="20577"/>
-      <pc:docMkLst>
-        <pc:docMk/>
-      </pc:docMkLst>
-      <pc:sldChg chg="modSp">
-        <pc:chgData name="McKinney, David" userId="S::kqkh779@astrazeneca.net::8b945cb3-78ce-42d7-adc5-b07bab32cd5b" providerId="AD" clId="Web-{2BB45DB9-A5C7-42D9-8D86-58E9C0F106AD}" dt="2020-03-26T12:03:13.542" v="3" actId="20577"/>
-        <pc:sldMkLst>
-          <pc:docMk/>
-          <pc:sldMk cId="2052954903" sldId="358"/>
-        </pc:sldMkLst>
-        <pc:spChg chg="mod">
-          <ac:chgData name="McKinney, David" userId="S::kqkh779@astrazeneca.net::8b945cb3-78ce-42d7-adc5-b07bab32cd5b" providerId="AD" clId="Web-{2BB45DB9-A5C7-42D9-8D86-58E9C0F106AD}" dt="2020-03-26T12:03:13.542" v="3" actId="20577"/>
-          <ac:spMkLst>
-            <pc:docMk/>
-            <pc:sldMk cId="2052954903" sldId="358"/>
-            <ac:spMk id="2" creationId="{C46CB304-3A01-0040-A35A-B50918C22C95}"/>
-          </ac:spMkLst>
-        </pc:spChg>
-      </pc:sldChg>
-    </pc:docChg>
-  </pc:docChgLst>
 </pc:chgInfo>
 </file>
 
@@ -958,7 +991,7 @@
             <a:fld id="{3BBED7E8-0829-F34C-B479-A757805E6C1B}" type="datetimeFigureOut">
               <a:rPr lang="en-US" smtClean="0"/>
               <a:pPr/>
-              <a:t>7/1/2020</a:t>
+              <a:t>3/11/2021</a:t>
             </a:fld>
             <a:endParaRPr lang="en-US"/>
           </a:p>
@@ -1126,7 +1159,7 @@
             <a:fld id="{6C7E4F11-7667-5045-A00B-01970EA44BB5}" type="datetimeFigureOut">
               <a:rPr lang="en-US" smtClean="0"/>
               <a:pPr/>
-              <a:t>7/1/2020</a:t>
+              <a:t>3/11/2021</a:t>
             </a:fld>
             <a:endParaRPr lang="en-US"/>
           </a:p>
@@ -1462,7 +1495,7 @@
             <a:fld id="{FAD751AE-7ABC-314D-AFAD-47B860ED6FFE}" type="slidenum">
               <a:rPr lang="en-US" smtClean="0"/>
               <a:pPr/>
-              <a:t>6</a:t>
+              <a:t>5</a:t>
             </a:fld>
             <a:endParaRPr lang="en-US"/>
           </a:p>
@@ -1547,7 +1580,7 @@
             <a:fld id="{FAD751AE-7ABC-314D-AFAD-47B860ED6FFE}" type="slidenum">
               <a:rPr lang="en-US" smtClean="0"/>
               <a:pPr/>
-              <a:t>15</a:t>
+              <a:t>14</a:t>
             </a:fld>
             <a:endParaRPr lang="en-US"/>
           </a:p>
@@ -1632,7 +1665,7 @@
             <a:fld id="{FAD751AE-7ABC-314D-AFAD-47B860ED6FFE}" type="slidenum">
               <a:rPr lang="en-US" smtClean="0"/>
               <a:pPr/>
-              <a:t>7</a:t>
+              <a:t>6</a:t>
             </a:fld>
             <a:endParaRPr lang="en-US"/>
           </a:p>
@@ -1717,7 +1750,7 @@
             <a:fld id="{FAD751AE-7ABC-314D-AFAD-47B860ED6FFE}" type="slidenum">
               <a:rPr lang="en-US" smtClean="0"/>
               <a:pPr/>
-              <a:t>8</a:t>
+              <a:t>7</a:t>
             </a:fld>
             <a:endParaRPr lang="en-US"/>
           </a:p>
@@ -1802,7 +1835,7 @@
             <a:fld id="{FAD751AE-7ABC-314D-AFAD-47B860ED6FFE}" type="slidenum">
               <a:rPr lang="en-US" smtClean="0"/>
               <a:pPr/>
-              <a:t>9</a:t>
+              <a:t>8</a:t>
             </a:fld>
             <a:endParaRPr lang="en-US"/>
           </a:p>
@@ -1887,7 +1920,7 @@
             <a:fld id="{FAD751AE-7ABC-314D-AFAD-47B860ED6FFE}" type="slidenum">
               <a:rPr lang="en-US" smtClean="0"/>
               <a:pPr/>
-              <a:t>10</a:t>
+              <a:t>9</a:t>
             </a:fld>
             <a:endParaRPr lang="en-US"/>
           </a:p>
@@ -1972,7 +2005,7 @@
             <a:fld id="{FAD751AE-7ABC-314D-AFAD-47B860ED6FFE}" type="slidenum">
               <a:rPr lang="en-US" smtClean="0"/>
               <a:pPr/>
-              <a:t>11</a:t>
+              <a:t>10</a:t>
             </a:fld>
             <a:endParaRPr lang="en-US"/>
           </a:p>
@@ -2057,7 +2090,7 @@
             <a:fld id="{FAD751AE-7ABC-314D-AFAD-47B860ED6FFE}" type="slidenum">
               <a:rPr lang="en-US" smtClean="0"/>
               <a:pPr/>
-              <a:t>12</a:t>
+              <a:t>11</a:t>
             </a:fld>
             <a:endParaRPr lang="en-US"/>
           </a:p>
@@ -2142,7 +2175,7 @@
             <a:fld id="{FAD751AE-7ABC-314D-AFAD-47B860ED6FFE}" type="slidenum">
               <a:rPr lang="en-US" smtClean="0"/>
               <a:pPr/>
-              <a:t>13</a:t>
+              <a:t>12</a:t>
             </a:fld>
             <a:endParaRPr lang="en-US"/>
           </a:p>
@@ -2227,7 +2260,7 @@
             <a:fld id="{FAD751AE-7ABC-314D-AFAD-47B860ED6FFE}" type="slidenum">
               <a:rPr lang="en-US" smtClean="0"/>
               <a:pPr/>
-              <a:t>14</a:t>
+              <a:t>13</a:t>
             </a:fld>
             <a:endParaRPr lang="en-US"/>
           </a:p>
@@ -28100,7 +28133,7 @@
           <a:p>
             <a:r>
               <a:rPr lang="en-GB" dirty="0"/>
-              <a:t>Manipulating Dictionaries Puzzles</a:t>
+              <a:t>Manipulating Dictionaries Puzzles Solutions</a:t>
             </a:r>
           </a:p>
         </p:txBody>
@@ -28164,337 +28197,70 @@
           </a:prstGeom>
         </p:spPr>
       </p:pic>
-      <p:sp>
-        <p:nvSpPr>
-          <p:cNvPr id="6" name="Text Placeholder 2">
+      <p:pic>
+        <p:nvPicPr>
+          <p:cNvPr id="4" name="Picture 3">
             <a:extLst>
               <a:ext uri="{FF2B5EF4-FFF2-40B4-BE49-F238E27FC236}">
-                <a16:creationId xmlns:a16="http://schemas.microsoft.com/office/drawing/2014/main" id="{28280EFD-605B-4843-8D20-931E34B69861}"/>
+                <a16:creationId xmlns:a16="http://schemas.microsoft.com/office/drawing/2014/main" id="{086DF6B8-9658-447E-9310-708F9923319C}"/>
               </a:ext>
             </a:extLst>
           </p:cNvPr>
-          <p:cNvSpPr txBox="1">
-            <a:spLocks/>
-          </p:cNvSpPr>
+          <p:cNvPicPr>
+            <a:picLocks noChangeAspect="1"/>
+          </p:cNvPicPr>
           <p:nvPr/>
-        </p:nvSpPr>
-        <p:spPr>
-          <a:xfrm>
-            <a:off x="237061" y="712956"/>
-            <a:ext cx="8619938" cy="3749315"/>
-          </a:xfrm>
-          <a:prstGeom prst="rect">
-            <a:avLst/>
-          </a:prstGeom>
-        </p:spPr>
-        <p:txBody>
-          <a:bodyPr vert="horz" anchor="t"/>
-          <a:lstStyle>
-            <a:lvl1pPr marL="0" indent="0" algn="l" defTabSz="457200" rtl="0" eaLnBrk="1" latinLnBrk="0" hangingPunct="1">
-              <a:spcBef>
-                <a:spcPts val="0"/>
-              </a:spcBef>
-              <a:buFont typeface="Arial"/>
-              <a:buNone/>
-              <a:defRPr sz="2400" kern="1200" baseline="0">
-                <a:solidFill>
-                  <a:schemeClr val="tx1"/>
-                </a:solidFill>
-                <a:latin typeface="Arial" pitchFamily="34" charset="0"/>
-                <a:ea typeface="+mn-ea"/>
-                <a:cs typeface="Arial" pitchFamily="34" charset="0"/>
-              </a:defRPr>
-            </a:lvl1pPr>
-            <a:lvl2pPr marL="457200" indent="0" algn="l" defTabSz="457200" rtl="0" eaLnBrk="1" latinLnBrk="0" hangingPunct="1">
-              <a:spcBef>
-                <a:spcPct val="20000"/>
-              </a:spcBef>
-              <a:buFont typeface="Arial"/>
-              <a:buNone/>
-              <a:defRPr sz="2400" kern="1200">
-                <a:solidFill>
-                  <a:schemeClr val="tx1"/>
-                </a:solidFill>
-                <a:latin typeface="+mn-lt"/>
-                <a:ea typeface="+mn-ea"/>
-                <a:cs typeface="+mn-cs"/>
-              </a:defRPr>
-            </a:lvl2pPr>
-            <a:lvl3pPr marL="914400" indent="0" algn="l" defTabSz="457200" rtl="0" eaLnBrk="1" latinLnBrk="0" hangingPunct="1">
-              <a:spcBef>
-                <a:spcPct val="20000"/>
-              </a:spcBef>
-              <a:buFont typeface="Arial"/>
-              <a:buNone/>
-              <a:defRPr sz="2400" kern="1200">
-                <a:solidFill>
-                  <a:schemeClr val="tx1"/>
-                </a:solidFill>
-                <a:latin typeface="+mn-lt"/>
-                <a:ea typeface="+mn-ea"/>
-                <a:cs typeface="+mn-cs"/>
-              </a:defRPr>
-            </a:lvl3pPr>
-            <a:lvl4pPr marL="1371600" indent="0" algn="l" defTabSz="457200" rtl="0" eaLnBrk="1" latinLnBrk="0" hangingPunct="1">
-              <a:spcBef>
-                <a:spcPct val="20000"/>
-              </a:spcBef>
-              <a:buFont typeface="Arial"/>
-              <a:buNone/>
-              <a:defRPr sz="2400" kern="1200">
-                <a:solidFill>
-                  <a:schemeClr val="tx1"/>
-                </a:solidFill>
-                <a:latin typeface="+mn-lt"/>
-                <a:ea typeface="+mn-ea"/>
-                <a:cs typeface="+mn-cs"/>
-              </a:defRPr>
-            </a:lvl4pPr>
-            <a:lvl5pPr marL="1828800" indent="0" algn="l" defTabSz="457200" rtl="0" eaLnBrk="1" latinLnBrk="0" hangingPunct="1">
-              <a:spcBef>
-                <a:spcPct val="20000"/>
-              </a:spcBef>
-              <a:buFont typeface="Arial"/>
-              <a:buNone/>
-              <a:defRPr sz="2400" kern="1200">
-                <a:solidFill>
-                  <a:schemeClr val="tx1"/>
-                </a:solidFill>
-                <a:latin typeface="+mn-lt"/>
-                <a:ea typeface="+mn-ea"/>
-                <a:cs typeface="+mn-cs"/>
-              </a:defRPr>
-            </a:lvl5pPr>
-            <a:lvl6pPr marL="2514600" indent="-228600" algn="l" defTabSz="457200" rtl="0" eaLnBrk="1" latinLnBrk="0" hangingPunct="1">
-              <a:spcBef>
-                <a:spcPct val="20000"/>
-              </a:spcBef>
-              <a:buFont typeface="Arial"/>
-              <a:buChar char="•"/>
-              <a:defRPr sz="2000" kern="1200">
-                <a:solidFill>
-                  <a:schemeClr val="tx1"/>
-                </a:solidFill>
-                <a:latin typeface="+mn-lt"/>
-                <a:ea typeface="+mn-ea"/>
-                <a:cs typeface="+mn-cs"/>
-              </a:defRPr>
-            </a:lvl6pPr>
-            <a:lvl7pPr marL="2971800" indent="-228600" algn="l" defTabSz="457200" rtl="0" eaLnBrk="1" latinLnBrk="0" hangingPunct="1">
-              <a:spcBef>
-                <a:spcPct val="20000"/>
-              </a:spcBef>
-              <a:buFont typeface="Arial"/>
-              <a:buChar char="•"/>
-              <a:defRPr sz="2000" kern="1200">
-                <a:solidFill>
-                  <a:schemeClr val="tx1"/>
-                </a:solidFill>
-                <a:latin typeface="+mn-lt"/>
-                <a:ea typeface="+mn-ea"/>
-                <a:cs typeface="+mn-cs"/>
-              </a:defRPr>
-            </a:lvl7pPr>
-            <a:lvl8pPr marL="3429000" indent="-228600" algn="l" defTabSz="457200" rtl="0" eaLnBrk="1" latinLnBrk="0" hangingPunct="1">
-              <a:spcBef>
-                <a:spcPct val="20000"/>
-              </a:spcBef>
-              <a:buFont typeface="Arial"/>
-              <a:buChar char="•"/>
-              <a:defRPr sz="2000" kern="1200">
-                <a:solidFill>
-                  <a:schemeClr val="tx1"/>
-                </a:solidFill>
-                <a:latin typeface="+mn-lt"/>
-                <a:ea typeface="+mn-ea"/>
-                <a:cs typeface="+mn-cs"/>
-              </a:defRPr>
-            </a:lvl8pPr>
-            <a:lvl9pPr marL="3886200" indent="-228600" algn="l" defTabSz="457200" rtl="0" eaLnBrk="1" latinLnBrk="0" hangingPunct="1">
-              <a:spcBef>
-                <a:spcPct val="20000"/>
-              </a:spcBef>
-              <a:buFont typeface="Arial"/>
-              <a:buChar char="•"/>
-              <a:defRPr sz="2000" kern="1200">
-                <a:solidFill>
-                  <a:schemeClr val="tx1"/>
-                </a:solidFill>
-                <a:latin typeface="+mn-lt"/>
-                <a:ea typeface="+mn-ea"/>
-                <a:cs typeface="+mn-cs"/>
-              </a:defRPr>
-            </a:lvl9pPr>
-          </a:lstStyle>
-          <a:p>
-            <a:pPr marL="342900" indent="-342900">
-              <a:buFont typeface="Arial"/>
-              <a:buChar char="•"/>
-            </a:pPr>
-            <a:r>
-              <a:rPr lang="en-GB" sz="2000" dirty="0">
-                <a:latin typeface="Arial"/>
-                <a:cs typeface="Arial"/>
-              </a:rPr>
-              <a:t>Create a dictionary containing with keys ‘one’, ‘two’, and ‘three’ which corresponding values 1, 2, and 4</a:t>
-            </a:r>
-          </a:p>
-          <a:p>
-            <a:pPr marL="342900" indent="-342900">
-              <a:buFont typeface="Arial"/>
-              <a:buChar char="•"/>
-            </a:pPr>
-            <a:r>
-              <a:rPr lang="en-GB" sz="2000" dirty="0">
-                <a:latin typeface="Arial"/>
-                <a:cs typeface="Arial"/>
-              </a:rPr>
-              <a:t>Correct the value for key ‘three’ to be 3 and add a new pair ‘four’: 4</a:t>
-            </a:r>
-          </a:p>
-          <a:p>
-            <a:pPr marL="342900" indent="-342900">
-              <a:buFont typeface="Arial"/>
-              <a:buChar char="•"/>
-            </a:pPr>
-            <a:endParaRPr lang="en-GB" sz="2000" dirty="0">
-              <a:latin typeface="Arial"/>
-              <a:cs typeface="Arial"/>
-            </a:endParaRPr>
-          </a:p>
-          <a:p>
-            <a:pPr marL="342900" indent="-342900">
-              <a:buFont typeface="Arial"/>
-              <a:buChar char="•"/>
-            </a:pPr>
-            <a:r>
-              <a:rPr lang="en-GB" sz="2000" dirty="0">
-                <a:latin typeface="Arial"/>
-                <a:cs typeface="Arial"/>
-              </a:rPr>
-              <a:t>Create an empty dictionary called </a:t>
-            </a:r>
-            <a:r>
-              <a:rPr lang="en-GB" sz="2000" dirty="0">
-                <a:latin typeface="Consolas" panose="020B0609020204030204" pitchFamily="49" charset="0"/>
-                <a:cs typeface="Arial"/>
-              </a:rPr>
-              <a:t>square</a:t>
-            </a:r>
-          </a:p>
-          <a:p>
-            <a:pPr marL="342900" indent="-342900">
-              <a:buFont typeface="Arial"/>
-              <a:buChar char="•"/>
-            </a:pPr>
-            <a:r>
-              <a:rPr lang="en-GB" sz="2000" dirty="0">
-                <a:latin typeface="Arial"/>
-                <a:cs typeface="Arial"/>
-              </a:rPr>
-              <a:t>Loop through the range -5 to 5 (inclusive), each time adding an item to the dictionary which maps the looping variable to its square</a:t>
-            </a:r>
-          </a:p>
-          <a:p>
-            <a:pPr marL="342900" indent="-342900">
-              <a:buFont typeface="Arial"/>
-              <a:buChar char="•"/>
-            </a:pPr>
-            <a:endParaRPr lang="en-GB" sz="2000" dirty="0">
-              <a:latin typeface="Arial"/>
-              <a:cs typeface="Arial"/>
-            </a:endParaRPr>
-          </a:p>
-          <a:p>
-            <a:pPr marL="342900" indent="-342900">
-              <a:buFont typeface="Arial"/>
-              <a:buChar char="•"/>
-            </a:pPr>
-            <a:r>
-              <a:rPr lang="en-GB" sz="2000" b="1" dirty="0">
-                <a:latin typeface="Arial"/>
-                <a:cs typeface="Arial"/>
-              </a:rPr>
-              <a:t>Bonus: </a:t>
-            </a:r>
-            <a:r>
-              <a:rPr lang="en-GB" sz="2000" dirty="0">
-                <a:latin typeface="Arial"/>
-                <a:cs typeface="Arial"/>
-              </a:rPr>
-              <a:t>Create a dictionary called employees which contains two dictionaries, each giving the details (say, job title and manager) of a different employee. Access the manager of one of the employees</a:t>
-            </a:r>
-            <a:endParaRPr lang="en-GB" sz="2000" b="1" dirty="0">
-              <a:latin typeface="Arial"/>
-              <a:cs typeface="Arial"/>
-            </a:endParaRPr>
-          </a:p>
-          <a:p>
-            <a:pPr marL="342900" indent="-342900">
-              <a:buFont typeface="Arial"/>
-              <a:buChar char="•"/>
-            </a:pPr>
-            <a:endParaRPr lang="en-GB" sz="2000" dirty="0">
-              <a:latin typeface="Arial"/>
-              <a:cs typeface="Arial"/>
-            </a:endParaRPr>
-          </a:p>
-          <a:p>
-            <a:pPr marL="342900" indent="-342900">
-              <a:buFont typeface="Arial"/>
-              <a:buChar char="•"/>
-            </a:pPr>
-            <a:endParaRPr lang="en-GB" sz="2000" dirty="0">
-              <a:latin typeface="Arial"/>
-              <a:cs typeface="Arial"/>
-            </a:endParaRPr>
-          </a:p>
-          <a:p>
-            <a:pPr marL="342900" indent="-342900">
-              <a:buFont typeface="Arial"/>
-              <a:buChar char="•"/>
-            </a:pPr>
-            <a:endParaRPr lang="en-GB" sz="2000" dirty="0">
-              <a:latin typeface="Arial"/>
-              <a:cs typeface="Arial"/>
-            </a:endParaRPr>
-          </a:p>
-          <a:p>
-            <a:pPr marL="342900" indent="-342900">
-              <a:buFont typeface="Arial"/>
-              <a:buChar char="•"/>
-            </a:pPr>
-            <a:endParaRPr lang="en-GB" sz="2000" dirty="0">
-              <a:latin typeface="Arial"/>
-              <a:cs typeface="Arial"/>
-            </a:endParaRPr>
-          </a:p>
-          <a:p>
-            <a:pPr marL="342900" indent="-342900">
-              <a:buFont typeface="Arial"/>
-              <a:buChar char="•"/>
-            </a:pPr>
-            <a:endParaRPr lang="en-GB" sz="2000" dirty="0">
-              <a:latin typeface="Arial"/>
-              <a:cs typeface="Arial"/>
-            </a:endParaRPr>
-          </a:p>
-          <a:p>
-            <a:pPr marL="342900" indent="-342900">
-              <a:buFont typeface="Arial"/>
-              <a:buChar char="•"/>
-            </a:pPr>
-            <a:endParaRPr lang="en-GB" sz="2000" dirty="0">
-              <a:latin typeface="Arial"/>
-              <a:cs typeface="Arial"/>
-            </a:endParaRPr>
-          </a:p>
-        </p:txBody>
-      </p:sp>
+        </p:nvPicPr>
+        <p:blipFill>
+          <a:blip r:embed="rId4"/>
+          <a:stretch>
+            <a:fillRect/>
+          </a:stretch>
+        </p:blipFill>
+        <p:spPr>
+          <a:xfrm>
+            <a:off x="1516345" y="1188438"/>
+            <a:ext cx="6111310" cy="1238041"/>
+          </a:xfrm>
+          <a:prstGeom prst="rect">
+            <a:avLst/>
+          </a:prstGeom>
+        </p:spPr>
+      </p:pic>
+      <p:pic>
+        <p:nvPicPr>
+          <p:cNvPr id="5" name="Picture 4">
+            <a:extLst>
+              <a:ext uri="{FF2B5EF4-FFF2-40B4-BE49-F238E27FC236}">
+                <a16:creationId xmlns:a16="http://schemas.microsoft.com/office/drawing/2014/main" id="{362C70F6-8FF2-4745-B1DB-384D73581C3A}"/>
+              </a:ext>
+            </a:extLst>
+          </p:cNvPr>
+          <p:cNvPicPr>
+            <a:picLocks noChangeAspect="1"/>
+          </p:cNvPicPr>
+          <p:nvPr/>
+        </p:nvPicPr>
+        <p:blipFill>
+          <a:blip r:embed="rId5"/>
+          <a:stretch>
+            <a:fillRect/>
+          </a:stretch>
+        </p:blipFill>
+        <p:spPr>
+          <a:xfrm>
+            <a:off x="2674715" y="2966917"/>
+            <a:ext cx="3794570" cy="1446206"/>
+          </a:xfrm>
+          <a:prstGeom prst="rect">
+            <a:avLst/>
+          </a:prstGeom>
+        </p:spPr>
+      </p:pic>
     </p:spTree>
     <p:extLst>
       <p:ext uri="{BB962C8B-B14F-4D97-AF65-F5344CB8AC3E}">
-        <p14:creationId xmlns:p14="http://schemas.microsoft.com/office/powerpoint/2010/main" val="756925942"/>
+        <p14:creationId xmlns:p14="http://schemas.microsoft.com/office/powerpoint/2010/main" val="3894219608"/>
       </p:ext>
     </p:extLst>
   </p:cSld>
@@ -28544,7 +28310,7 @@
           <a:p>
             <a:r>
               <a:rPr lang="en-GB" dirty="0"/>
-              <a:t>Manipulating Dictionaries Puzzles Solutions</a:t>
+              <a:t>Looping Through Dictionaries</a:t>
             </a:r>
           </a:p>
         </p:txBody>
@@ -28574,183 +28340,6 @@
               <a:rPr lang="en-GB" smtClean="0"/>
               <a:pPr/>
               <a:t>11</a:t>
-            </a:fld>
-            <a:endParaRPr lang="en-GB"/>
-          </a:p>
-        </p:txBody>
-      </p:sp>
-      <p:pic>
-        <p:nvPicPr>
-          <p:cNvPr id="11" name="Picture 10">
-            <a:extLst>
-              <a:ext uri="{FF2B5EF4-FFF2-40B4-BE49-F238E27FC236}">
-                <a16:creationId xmlns:a16="http://schemas.microsoft.com/office/drawing/2014/main" id="{AE10D547-F5D1-43D9-93EA-E166E3C73F57}"/>
-              </a:ext>
-            </a:extLst>
-          </p:cNvPr>
-          <p:cNvPicPr>
-            <a:picLocks noChangeAspect="1"/>
-          </p:cNvPicPr>
-          <p:nvPr/>
-        </p:nvPicPr>
-        <p:blipFill rotWithShape="1">
-          <a:blip r:embed="rId3"/>
-          <a:srcRect l="2982" t="3174" r="2869" b="2900"/>
-          <a:stretch/>
-        </p:blipFill>
-        <p:spPr>
-          <a:xfrm>
-            <a:off x="8576572" y="4598283"/>
-            <a:ext cx="498106" cy="496941"/>
-          </a:xfrm>
-          <a:prstGeom prst="ellipse">
-            <a:avLst/>
-          </a:prstGeom>
-        </p:spPr>
-      </p:pic>
-      <p:pic>
-        <p:nvPicPr>
-          <p:cNvPr id="4" name="Picture 3">
-            <a:extLst>
-              <a:ext uri="{FF2B5EF4-FFF2-40B4-BE49-F238E27FC236}">
-                <a16:creationId xmlns:a16="http://schemas.microsoft.com/office/drawing/2014/main" id="{086DF6B8-9658-447E-9310-708F9923319C}"/>
-              </a:ext>
-            </a:extLst>
-          </p:cNvPr>
-          <p:cNvPicPr>
-            <a:picLocks noChangeAspect="1"/>
-          </p:cNvPicPr>
-          <p:nvPr/>
-        </p:nvPicPr>
-        <p:blipFill>
-          <a:blip r:embed="rId4"/>
-          <a:stretch>
-            <a:fillRect/>
-          </a:stretch>
-        </p:blipFill>
-        <p:spPr>
-          <a:xfrm>
-            <a:off x="1516345" y="1188438"/>
-            <a:ext cx="6111310" cy="1238041"/>
-          </a:xfrm>
-          <a:prstGeom prst="rect">
-            <a:avLst/>
-          </a:prstGeom>
-        </p:spPr>
-      </p:pic>
-      <p:pic>
-        <p:nvPicPr>
-          <p:cNvPr id="5" name="Picture 4">
-            <a:extLst>
-              <a:ext uri="{FF2B5EF4-FFF2-40B4-BE49-F238E27FC236}">
-                <a16:creationId xmlns:a16="http://schemas.microsoft.com/office/drawing/2014/main" id="{362C70F6-8FF2-4745-B1DB-384D73581C3A}"/>
-              </a:ext>
-            </a:extLst>
-          </p:cNvPr>
-          <p:cNvPicPr>
-            <a:picLocks noChangeAspect="1"/>
-          </p:cNvPicPr>
-          <p:nvPr/>
-        </p:nvPicPr>
-        <p:blipFill>
-          <a:blip r:embed="rId5"/>
-          <a:stretch>
-            <a:fillRect/>
-          </a:stretch>
-        </p:blipFill>
-        <p:spPr>
-          <a:xfrm>
-            <a:off x="2674715" y="2966917"/>
-            <a:ext cx="3794570" cy="1446206"/>
-          </a:xfrm>
-          <a:prstGeom prst="rect">
-            <a:avLst/>
-          </a:prstGeom>
-        </p:spPr>
-      </p:pic>
-    </p:spTree>
-    <p:extLst>
-      <p:ext uri="{BB962C8B-B14F-4D97-AF65-F5344CB8AC3E}">
-        <p14:creationId xmlns:p14="http://schemas.microsoft.com/office/powerpoint/2010/main" val="3894219608"/>
-      </p:ext>
-    </p:extLst>
-  </p:cSld>
-  <p:clrMapOvr>
-    <a:masterClrMapping/>
-  </p:clrMapOvr>
-</p:sld>
-</file>
-
-<file path=ppt/slides/slide12.xml><?xml version="1.0" encoding="utf-8"?>
-<p:sld xmlns:a="http://schemas.openxmlformats.org/drawingml/2006/main" xmlns:r="http://schemas.openxmlformats.org/officeDocument/2006/relationships" xmlns:p="http://schemas.openxmlformats.org/presentationml/2006/main" showMasterSp="0">
-  <p:cSld>
-    <p:spTree>
-      <p:nvGrpSpPr>
-        <p:cNvPr id="1" name=""/>
-        <p:cNvGrpSpPr/>
-        <p:nvPr/>
-      </p:nvGrpSpPr>
-      <p:grpSpPr>
-        <a:xfrm>
-          <a:off x="0" y="0"/>
-          <a:ext cx="0" cy="0"/>
-          <a:chOff x="0" y="0"/>
-          <a:chExt cx="0" cy="0"/>
-        </a:xfrm>
-      </p:grpSpPr>
-      <p:sp>
-        <p:nvSpPr>
-          <p:cNvPr id="2" name="Title 1">
-            <a:extLst>
-              <a:ext uri="{FF2B5EF4-FFF2-40B4-BE49-F238E27FC236}">
-                <a16:creationId xmlns:a16="http://schemas.microsoft.com/office/drawing/2014/main" id="{F7DA9A4F-1DFD-49DB-8569-F5AB18BD6161}"/>
-              </a:ext>
-            </a:extLst>
-          </p:cNvPr>
-          <p:cNvSpPr>
-            <a:spLocks noGrp="1"/>
-          </p:cNvSpPr>
-          <p:nvPr>
-            <p:ph type="title"/>
-          </p:nvPr>
-        </p:nvSpPr>
-        <p:spPr/>
-        <p:txBody>
-          <a:bodyPr/>
-          <a:lstStyle/>
-          <a:p>
-            <a:r>
-              <a:rPr lang="en-GB" dirty="0"/>
-              <a:t>Looping Through Dictionaries</a:t>
-            </a:r>
-          </a:p>
-        </p:txBody>
-      </p:sp>
-      <p:sp>
-        <p:nvSpPr>
-          <p:cNvPr id="3" name="Slide Number Placeholder 2">
-            <a:extLst>
-              <a:ext uri="{FF2B5EF4-FFF2-40B4-BE49-F238E27FC236}">
-                <a16:creationId xmlns:a16="http://schemas.microsoft.com/office/drawing/2014/main" id="{7C3E703A-A386-472F-AD27-D2D983CC7A66}"/>
-              </a:ext>
-            </a:extLst>
-          </p:cNvPr>
-          <p:cNvSpPr>
-            <a:spLocks noGrp="1"/>
-          </p:cNvSpPr>
-          <p:nvPr>
-            <p:ph type="sldNum" sz="quarter" idx="4"/>
-          </p:nvPr>
-        </p:nvSpPr>
-        <p:spPr/>
-        <p:txBody>
-          <a:bodyPr/>
-          <a:lstStyle/>
-          <a:p>
-            <a:fld id="{3C4F54F3-C349-4609-AFEE-01462D5C7942}" type="slidenum">
-              <a:rPr lang="en-GB" smtClean="0"/>
-              <a:pPr/>
-              <a:t>12</a:t>
             </a:fld>
             <a:endParaRPr lang="en-GB"/>
           </a:p>
@@ -30031,7 +29620,7 @@
 </p:sld>
 </file>
 
-<file path=ppt/slides/slide13.xml><?xml version="1.0" encoding="utf-8"?>
+<file path=ppt/slides/slide12.xml><?xml version="1.0" encoding="utf-8"?>
 <p:sld xmlns:a="http://schemas.openxmlformats.org/drawingml/2006/main" xmlns:r="http://schemas.openxmlformats.org/officeDocument/2006/relationships" xmlns:p="http://schemas.openxmlformats.org/presentationml/2006/main" showMasterSp="0">
   <p:cSld>
     <p:spTree>
@@ -30100,7 +29689,7 @@
             <a:fld id="{3C4F54F3-C349-4609-AFEE-01462D5C7942}" type="slidenum">
               <a:rPr lang="en-GB" smtClean="0"/>
               <a:pPr/>
-              <a:t>13</a:t>
+              <a:t>12</a:t>
             </a:fld>
             <a:endParaRPr lang="en-GB"/>
           </a:p>
@@ -30384,6 +29973,153 @@
     <p:extLst>
       <p:ext uri="{BB962C8B-B14F-4D97-AF65-F5344CB8AC3E}">
         <p14:creationId xmlns:p14="http://schemas.microsoft.com/office/powerpoint/2010/main" val="441067147"/>
+      </p:ext>
+    </p:extLst>
+  </p:cSld>
+  <p:clrMapOvr>
+    <a:masterClrMapping/>
+  </p:clrMapOvr>
+</p:sld>
+</file>
+
+<file path=ppt/slides/slide13.xml><?xml version="1.0" encoding="utf-8"?>
+<p:sld xmlns:a="http://schemas.openxmlformats.org/drawingml/2006/main" xmlns:r="http://schemas.openxmlformats.org/officeDocument/2006/relationships" xmlns:p="http://schemas.openxmlformats.org/presentationml/2006/main" showMasterSp="0">
+  <p:cSld>
+    <p:spTree>
+      <p:nvGrpSpPr>
+        <p:cNvPr id="1" name=""/>
+        <p:cNvGrpSpPr/>
+        <p:nvPr/>
+      </p:nvGrpSpPr>
+      <p:grpSpPr>
+        <a:xfrm>
+          <a:off x="0" y="0"/>
+          <a:ext cx="0" cy="0"/>
+          <a:chOff x="0" y="0"/>
+          <a:chExt cx="0" cy="0"/>
+        </a:xfrm>
+      </p:grpSpPr>
+      <p:sp>
+        <p:nvSpPr>
+          <p:cNvPr id="2" name="Title 1">
+            <a:extLst>
+              <a:ext uri="{FF2B5EF4-FFF2-40B4-BE49-F238E27FC236}">
+                <a16:creationId xmlns:a16="http://schemas.microsoft.com/office/drawing/2014/main" id="{F7DA9A4F-1DFD-49DB-8569-F5AB18BD6161}"/>
+              </a:ext>
+            </a:extLst>
+          </p:cNvPr>
+          <p:cNvSpPr>
+            <a:spLocks noGrp="1"/>
+          </p:cNvSpPr>
+          <p:nvPr>
+            <p:ph type="title"/>
+          </p:nvPr>
+        </p:nvSpPr>
+        <p:spPr/>
+        <p:txBody>
+          <a:bodyPr/>
+          <a:lstStyle/>
+          <a:p>
+            <a:r>
+              <a:rPr lang="en-GB" dirty="0"/>
+              <a:t>Looping Through Dictionaries Puzzles Solutions</a:t>
+            </a:r>
+          </a:p>
+        </p:txBody>
+      </p:sp>
+      <p:sp>
+        <p:nvSpPr>
+          <p:cNvPr id="3" name="Slide Number Placeholder 2">
+            <a:extLst>
+              <a:ext uri="{FF2B5EF4-FFF2-40B4-BE49-F238E27FC236}">
+                <a16:creationId xmlns:a16="http://schemas.microsoft.com/office/drawing/2014/main" id="{7C3E703A-A386-472F-AD27-D2D983CC7A66}"/>
+              </a:ext>
+            </a:extLst>
+          </p:cNvPr>
+          <p:cNvSpPr>
+            <a:spLocks noGrp="1"/>
+          </p:cNvSpPr>
+          <p:nvPr>
+            <p:ph type="sldNum" sz="quarter" idx="4"/>
+          </p:nvPr>
+        </p:nvSpPr>
+        <p:spPr/>
+        <p:txBody>
+          <a:bodyPr/>
+          <a:lstStyle/>
+          <a:p>
+            <a:fld id="{3C4F54F3-C349-4609-AFEE-01462D5C7942}" type="slidenum">
+              <a:rPr lang="en-GB" smtClean="0"/>
+              <a:pPr/>
+              <a:t>13</a:t>
+            </a:fld>
+            <a:endParaRPr lang="en-GB"/>
+          </a:p>
+        </p:txBody>
+      </p:sp>
+      <p:pic>
+        <p:nvPicPr>
+          <p:cNvPr id="11" name="Picture 10">
+            <a:extLst>
+              <a:ext uri="{FF2B5EF4-FFF2-40B4-BE49-F238E27FC236}">
+                <a16:creationId xmlns:a16="http://schemas.microsoft.com/office/drawing/2014/main" id="{AE10D547-F5D1-43D9-93EA-E166E3C73F57}"/>
+              </a:ext>
+            </a:extLst>
+          </p:cNvPr>
+          <p:cNvPicPr>
+            <a:picLocks noChangeAspect="1"/>
+          </p:cNvPicPr>
+          <p:nvPr/>
+        </p:nvPicPr>
+        <p:blipFill rotWithShape="1">
+          <a:blip r:embed="rId3"/>
+          <a:srcRect l="2982" t="3174" r="2869" b="2900"/>
+          <a:stretch/>
+        </p:blipFill>
+        <p:spPr>
+          <a:xfrm>
+            <a:off x="8576572" y="4598283"/>
+            <a:ext cx="498106" cy="496941"/>
+          </a:xfrm>
+          <a:prstGeom prst="ellipse">
+            <a:avLst/>
+          </a:prstGeom>
+        </p:spPr>
+      </p:pic>
+      <p:pic>
+        <p:nvPicPr>
+          <p:cNvPr id="5" name="Picture 4">
+            <a:extLst>
+              <a:ext uri="{FF2B5EF4-FFF2-40B4-BE49-F238E27FC236}">
+                <a16:creationId xmlns:a16="http://schemas.microsoft.com/office/drawing/2014/main" id="{6FFEA870-4812-46E3-AE8E-861E1F7A3BF5}"/>
+              </a:ext>
+            </a:extLst>
+          </p:cNvPr>
+          <p:cNvPicPr>
+            <a:picLocks noChangeAspect="1"/>
+          </p:cNvPicPr>
+          <p:nvPr/>
+        </p:nvPicPr>
+        <p:blipFill>
+          <a:blip r:embed="rId4"/>
+          <a:stretch>
+            <a:fillRect/>
+          </a:stretch>
+        </p:blipFill>
+        <p:spPr>
+          <a:xfrm>
+            <a:off x="2335534" y="950056"/>
+            <a:ext cx="4472931" cy="3791107"/>
+          </a:xfrm>
+          <a:prstGeom prst="rect">
+            <a:avLst/>
+          </a:prstGeom>
+        </p:spPr>
+      </p:pic>
+    </p:spTree>
+    <p:extLst>
+      <p:ext uri="{BB962C8B-B14F-4D97-AF65-F5344CB8AC3E}">
+        <p14:creationId xmlns:p14="http://schemas.microsoft.com/office/powerpoint/2010/main" val="3469896898"/>
       </p:ext>
     </p:extLst>
   </p:cSld>
@@ -30433,7 +30169,7 @@
           <a:p>
             <a:r>
               <a:rPr lang="en-GB" dirty="0"/>
-              <a:t>Looping Through Dictionaries Puzzles Solutions</a:t>
+              <a:t>Tangent: APIs and JSON</a:t>
             </a:r>
           </a:p>
         </p:txBody>
@@ -30463,153 +30199,6 @@
               <a:rPr lang="en-GB" smtClean="0"/>
               <a:pPr/>
               <a:t>14</a:t>
-            </a:fld>
-            <a:endParaRPr lang="en-GB"/>
-          </a:p>
-        </p:txBody>
-      </p:sp>
-      <p:pic>
-        <p:nvPicPr>
-          <p:cNvPr id="11" name="Picture 10">
-            <a:extLst>
-              <a:ext uri="{FF2B5EF4-FFF2-40B4-BE49-F238E27FC236}">
-                <a16:creationId xmlns:a16="http://schemas.microsoft.com/office/drawing/2014/main" id="{AE10D547-F5D1-43D9-93EA-E166E3C73F57}"/>
-              </a:ext>
-            </a:extLst>
-          </p:cNvPr>
-          <p:cNvPicPr>
-            <a:picLocks noChangeAspect="1"/>
-          </p:cNvPicPr>
-          <p:nvPr/>
-        </p:nvPicPr>
-        <p:blipFill rotWithShape="1">
-          <a:blip r:embed="rId3"/>
-          <a:srcRect l="2982" t="3174" r="2869" b="2900"/>
-          <a:stretch/>
-        </p:blipFill>
-        <p:spPr>
-          <a:xfrm>
-            <a:off x="8576572" y="4598283"/>
-            <a:ext cx="498106" cy="496941"/>
-          </a:xfrm>
-          <a:prstGeom prst="ellipse">
-            <a:avLst/>
-          </a:prstGeom>
-        </p:spPr>
-      </p:pic>
-      <p:pic>
-        <p:nvPicPr>
-          <p:cNvPr id="5" name="Picture 4">
-            <a:extLst>
-              <a:ext uri="{FF2B5EF4-FFF2-40B4-BE49-F238E27FC236}">
-                <a16:creationId xmlns:a16="http://schemas.microsoft.com/office/drawing/2014/main" id="{6FFEA870-4812-46E3-AE8E-861E1F7A3BF5}"/>
-              </a:ext>
-            </a:extLst>
-          </p:cNvPr>
-          <p:cNvPicPr>
-            <a:picLocks noChangeAspect="1"/>
-          </p:cNvPicPr>
-          <p:nvPr/>
-        </p:nvPicPr>
-        <p:blipFill>
-          <a:blip r:embed="rId4"/>
-          <a:stretch>
-            <a:fillRect/>
-          </a:stretch>
-        </p:blipFill>
-        <p:spPr>
-          <a:xfrm>
-            <a:off x="2335534" y="950056"/>
-            <a:ext cx="4472931" cy="3791107"/>
-          </a:xfrm>
-          <a:prstGeom prst="rect">
-            <a:avLst/>
-          </a:prstGeom>
-        </p:spPr>
-      </p:pic>
-    </p:spTree>
-    <p:extLst>
-      <p:ext uri="{BB962C8B-B14F-4D97-AF65-F5344CB8AC3E}">
-        <p14:creationId xmlns:p14="http://schemas.microsoft.com/office/powerpoint/2010/main" val="3469896898"/>
-      </p:ext>
-    </p:extLst>
-  </p:cSld>
-  <p:clrMapOvr>
-    <a:masterClrMapping/>
-  </p:clrMapOvr>
-</p:sld>
-</file>
-
-<file path=ppt/slides/slide15.xml><?xml version="1.0" encoding="utf-8"?>
-<p:sld xmlns:a="http://schemas.openxmlformats.org/drawingml/2006/main" xmlns:r="http://schemas.openxmlformats.org/officeDocument/2006/relationships" xmlns:p="http://schemas.openxmlformats.org/presentationml/2006/main" showMasterSp="0">
-  <p:cSld>
-    <p:spTree>
-      <p:nvGrpSpPr>
-        <p:cNvPr id="1" name=""/>
-        <p:cNvGrpSpPr/>
-        <p:nvPr/>
-      </p:nvGrpSpPr>
-      <p:grpSpPr>
-        <a:xfrm>
-          <a:off x="0" y="0"/>
-          <a:ext cx="0" cy="0"/>
-          <a:chOff x="0" y="0"/>
-          <a:chExt cx="0" cy="0"/>
-        </a:xfrm>
-      </p:grpSpPr>
-      <p:sp>
-        <p:nvSpPr>
-          <p:cNvPr id="2" name="Title 1">
-            <a:extLst>
-              <a:ext uri="{FF2B5EF4-FFF2-40B4-BE49-F238E27FC236}">
-                <a16:creationId xmlns:a16="http://schemas.microsoft.com/office/drawing/2014/main" id="{F7DA9A4F-1DFD-49DB-8569-F5AB18BD6161}"/>
-              </a:ext>
-            </a:extLst>
-          </p:cNvPr>
-          <p:cNvSpPr>
-            <a:spLocks noGrp="1"/>
-          </p:cNvSpPr>
-          <p:nvPr>
-            <p:ph type="title"/>
-          </p:nvPr>
-        </p:nvSpPr>
-        <p:spPr/>
-        <p:txBody>
-          <a:bodyPr/>
-          <a:lstStyle/>
-          <a:p>
-            <a:r>
-              <a:rPr lang="en-GB" dirty="0"/>
-              <a:t>Tangent: APIs and JSON</a:t>
-            </a:r>
-          </a:p>
-        </p:txBody>
-      </p:sp>
-      <p:sp>
-        <p:nvSpPr>
-          <p:cNvPr id="3" name="Slide Number Placeholder 2">
-            <a:extLst>
-              <a:ext uri="{FF2B5EF4-FFF2-40B4-BE49-F238E27FC236}">
-                <a16:creationId xmlns:a16="http://schemas.microsoft.com/office/drawing/2014/main" id="{7C3E703A-A386-472F-AD27-D2D983CC7A66}"/>
-              </a:ext>
-            </a:extLst>
-          </p:cNvPr>
-          <p:cNvSpPr>
-            <a:spLocks noGrp="1"/>
-          </p:cNvSpPr>
-          <p:nvPr>
-            <p:ph type="sldNum" sz="quarter" idx="4"/>
-          </p:nvPr>
-        </p:nvSpPr>
-        <p:spPr/>
-        <p:txBody>
-          <a:bodyPr/>
-          <a:lstStyle/>
-          <a:p>
-            <a:fld id="{3C4F54F3-C349-4609-AFEE-01462D5C7942}" type="slidenum">
-              <a:rPr lang="en-GB" smtClean="0"/>
-              <a:pPr/>
-              <a:t>15</a:t>
             </a:fld>
             <a:endParaRPr lang="en-GB"/>
           </a:p>
@@ -32177,6 +31766,19 @@
               <a:t>We access dictionaries’ values in the same way as a list</a:t>
             </a:r>
           </a:p>
+          <a:p>
+            <a:pPr marL="342900" indent="-342900">
+              <a:buFont typeface="Arial"/>
+              <a:buChar char="•"/>
+            </a:pPr>
+            <a:r>
+              <a:rPr lang="en-GB" sz="2000" dirty="0">
+                <a:latin typeface="Arial"/>
+                <a:cs typeface="Arial"/>
+              </a:rPr>
+              <a:t>Dictionaries, unlike lists, have no defined order</a:t>
+            </a:r>
+          </a:p>
         </p:txBody>
       </p:sp>
       <p:pic>
@@ -32201,7 +31803,7 @@
         </p:blipFill>
         <p:spPr>
           <a:xfrm>
-            <a:off x="714375" y="3001066"/>
+            <a:off x="646527" y="3347617"/>
             <a:ext cx="4348749" cy="1429478"/>
           </a:xfrm>
           <a:prstGeom prst="rect">
@@ -32231,7 +31833,7 @@
         </p:blipFill>
         <p:spPr>
           <a:xfrm>
-            <a:off x="5463107" y="3184256"/>
+            <a:off x="5326919" y="3422514"/>
             <a:ext cx="2993909" cy="1063097"/>
           </a:xfrm>
           <a:prstGeom prst="rect">
@@ -32292,7 +31894,7 @@
           <a:p>
             <a:r>
               <a:rPr lang="en-GB" dirty="0"/>
-              <a:t>Tangent: Ordered Dictionaries</a:t>
+              <a:t>Dictionaries</a:t>
             </a:r>
           </a:p>
         </p:txBody>
@@ -32322,356 +31924,6 @@
               <a:rPr lang="en-GB" smtClean="0"/>
               <a:pPr/>
               <a:t>5</a:t>
-            </a:fld>
-            <a:endParaRPr lang="en-GB"/>
-          </a:p>
-        </p:txBody>
-      </p:sp>
-      <p:pic>
-        <p:nvPicPr>
-          <p:cNvPr id="11" name="Picture 10">
-            <a:extLst>
-              <a:ext uri="{FF2B5EF4-FFF2-40B4-BE49-F238E27FC236}">
-                <a16:creationId xmlns:a16="http://schemas.microsoft.com/office/drawing/2014/main" id="{AE10D547-F5D1-43D9-93EA-E166E3C73F57}"/>
-              </a:ext>
-            </a:extLst>
-          </p:cNvPr>
-          <p:cNvPicPr>
-            <a:picLocks noChangeAspect="1"/>
-          </p:cNvPicPr>
-          <p:nvPr/>
-        </p:nvPicPr>
-        <p:blipFill rotWithShape="1">
-          <a:blip r:embed="rId2"/>
-          <a:srcRect l="2982" t="3174" r="2869" b="2900"/>
-          <a:stretch/>
-        </p:blipFill>
-        <p:spPr>
-          <a:xfrm>
-            <a:off x="8576572" y="4598283"/>
-            <a:ext cx="498106" cy="496941"/>
-          </a:xfrm>
-          <a:prstGeom prst="ellipse">
-            <a:avLst/>
-          </a:prstGeom>
-        </p:spPr>
-      </p:pic>
-      <p:sp>
-        <p:nvSpPr>
-          <p:cNvPr id="6" name="Text Placeholder 2">
-            <a:extLst>
-              <a:ext uri="{FF2B5EF4-FFF2-40B4-BE49-F238E27FC236}">
-                <a16:creationId xmlns:a16="http://schemas.microsoft.com/office/drawing/2014/main" id="{28280EFD-605B-4843-8D20-931E34B69861}"/>
-              </a:ext>
-            </a:extLst>
-          </p:cNvPr>
-          <p:cNvSpPr txBox="1">
-            <a:spLocks/>
-          </p:cNvSpPr>
-          <p:nvPr/>
-        </p:nvSpPr>
-        <p:spPr>
-          <a:xfrm>
-            <a:off x="237061" y="712956"/>
-            <a:ext cx="8619938" cy="4226139"/>
-          </a:xfrm>
-          <a:prstGeom prst="rect">
-            <a:avLst/>
-          </a:prstGeom>
-        </p:spPr>
-        <p:txBody>
-          <a:bodyPr vert="horz" anchor="t"/>
-          <a:lstStyle>
-            <a:lvl1pPr marL="0" indent="0" algn="l" defTabSz="457200" rtl="0" eaLnBrk="1" latinLnBrk="0" hangingPunct="1">
-              <a:spcBef>
-                <a:spcPts val="0"/>
-              </a:spcBef>
-              <a:buFont typeface="Arial"/>
-              <a:buNone/>
-              <a:defRPr sz="2400" kern="1200" baseline="0">
-                <a:solidFill>
-                  <a:schemeClr val="tx1"/>
-                </a:solidFill>
-                <a:latin typeface="Arial" pitchFamily="34" charset="0"/>
-                <a:ea typeface="+mn-ea"/>
-                <a:cs typeface="Arial" pitchFamily="34" charset="0"/>
-              </a:defRPr>
-            </a:lvl1pPr>
-            <a:lvl2pPr marL="457200" indent="0" algn="l" defTabSz="457200" rtl="0" eaLnBrk="1" latinLnBrk="0" hangingPunct="1">
-              <a:spcBef>
-                <a:spcPct val="20000"/>
-              </a:spcBef>
-              <a:buFont typeface="Arial"/>
-              <a:buNone/>
-              <a:defRPr sz="2400" kern="1200">
-                <a:solidFill>
-                  <a:schemeClr val="tx1"/>
-                </a:solidFill>
-                <a:latin typeface="+mn-lt"/>
-                <a:ea typeface="+mn-ea"/>
-                <a:cs typeface="+mn-cs"/>
-              </a:defRPr>
-            </a:lvl2pPr>
-            <a:lvl3pPr marL="914400" indent="0" algn="l" defTabSz="457200" rtl="0" eaLnBrk="1" latinLnBrk="0" hangingPunct="1">
-              <a:spcBef>
-                <a:spcPct val="20000"/>
-              </a:spcBef>
-              <a:buFont typeface="Arial"/>
-              <a:buNone/>
-              <a:defRPr sz="2400" kern="1200">
-                <a:solidFill>
-                  <a:schemeClr val="tx1"/>
-                </a:solidFill>
-                <a:latin typeface="+mn-lt"/>
-                <a:ea typeface="+mn-ea"/>
-                <a:cs typeface="+mn-cs"/>
-              </a:defRPr>
-            </a:lvl3pPr>
-            <a:lvl4pPr marL="1371600" indent="0" algn="l" defTabSz="457200" rtl="0" eaLnBrk="1" latinLnBrk="0" hangingPunct="1">
-              <a:spcBef>
-                <a:spcPct val="20000"/>
-              </a:spcBef>
-              <a:buFont typeface="Arial"/>
-              <a:buNone/>
-              <a:defRPr sz="2400" kern="1200">
-                <a:solidFill>
-                  <a:schemeClr val="tx1"/>
-                </a:solidFill>
-                <a:latin typeface="+mn-lt"/>
-                <a:ea typeface="+mn-ea"/>
-                <a:cs typeface="+mn-cs"/>
-              </a:defRPr>
-            </a:lvl4pPr>
-            <a:lvl5pPr marL="1828800" indent="0" algn="l" defTabSz="457200" rtl="0" eaLnBrk="1" latinLnBrk="0" hangingPunct="1">
-              <a:spcBef>
-                <a:spcPct val="20000"/>
-              </a:spcBef>
-              <a:buFont typeface="Arial"/>
-              <a:buNone/>
-              <a:defRPr sz="2400" kern="1200">
-                <a:solidFill>
-                  <a:schemeClr val="tx1"/>
-                </a:solidFill>
-                <a:latin typeface="+mn-lt"/>
-                <a:ea typeface="+mn-ea"/>
-                <a:cs typeface="+mn-cs"/>
-              </a:defRPr>
-            </a:lvl5pPr>
-            <a:lvl6pPr marL="2514600" indent="-228600" algn="l" defTabSz="457200" rtl="0" eaLnBrk="1" latinLnBrk="0" hangingPunct="1">
-              <a:spcBef>
-                <a:spcPct val="20000"/>
-              </a:spcBef>
-              <a:buFont typeface="Arial"/>
-              <a:buChar char="•"/>
-              <a:defRPr sz="2000" kern="1200">
-                <a:solidFill>
-                  <a:schemeClr val="tx1"/>
-                </a:solidFill>
-                <a:latin typeface="+mn-lt"/>
-                <a:ea typeface="+mn-ea"/>
-                <a:cs typeface="+mn-cs"/>
-              </a:defRPr>
-            </a:lvl6pPr>
-            <a:lvl7pPr marL="2971800" indent="-228600" algn="l" defTabSz="457200" rtl="0" eaLnBrk="1" latinLnBrk="0" hangingPunct="1">
-              <a:spcBef>
-                <a:spcPct val="20000"/>
-              </a:spcBef>
-              <a:buFont typeface="Arial"/>
-              <a:buChar char="•"/>
-              <a:defRPr sz="2000" kern="1200">
-                <a:solidFill>
-                  <a:schemeClr val="tx1"/>
-                </a:solidFill>
-                <a:latin typeface="+mn-lt"/>
-                <a:ea typeface="+mn-ea"/>
-                <a:cs typeface="+mn-cs"/>
-              </a:defRPr>
-            </a:lvl7pPr>
-            <a:lvl8pPr marL="3429000" indent="-228600" algn="l" defTabSz="457200" rtl="0" eaLnBrk="1" latinLnBrk="0" hangingPunct="1">
-              <a:spcBef>
-                <a:spcPct val="20000"/>
-              </a:spcBef>
-              <a:buFont typeface="Arial"/>
-              <a:buChar char="•"/>
-              <a:defRPr sz="2000" kern="1200">
-                <a:solidFill>
-                  <a:schemeClr val="tx1"/>
-                </a:solidFill>
-                <a:latin typeface="+mn-lt"/>
-                <a:ea typeface="+mn-ea"/>
-                <a:cs typeface="+mn-cs"/>
-              </a:defRPr>
-            </a:lvl8pPr>
-            <a:lvl9pPr marL="3886200" indent="-228600" algn="l" defTabSz="457200" rtl="0" eaLnBrk="1" latinLnBrk="0" hangingPunct="1">
-              <a:spcBef>
-                <a:spcPct val="20000"/>
-              </a:spcBef>
-              <a:buFont typeface="Arial"/>
-              <a:buChar char="•"/>
-              <a:defRPr sz="2000" kern="1200">
-                <a:solidFill>
-                  <a:schemeClr val="tx1"/>
-                </a:solidFill>
-                <a:latin typeface="+mn-lt"/>
-                <a:ea typeface="+mn-ea"/>
-                <a:cs typeface="+mn-cs"/>
-              </a:defRPr>
-            </a:lvl9pPr>
-          </a:lstStyle>
-          <a:p>
-            <a:pPr marL="342900" indent="-342900">
-              <a:buFont typeface="Arial"/>
-              <a:buChar char="•"/>
-            </a:pPr>
-            <a:r>
-              <a:rPr lang="en-GB" sz="2000" dirty="0">
-                <a:latin typeface="Arial"/>
-                <a:cs typeface="Arial"/>
-              </a:rPr>
-              <a:t>Python does not keep track of the order of keys in a standard dictionary</a:t>
-            </a:r>
-          </a:p>
-          <a:p>
-            <a:pPr marL="342900" indent="-342900">
-              <a:buFont typeface="Arial"/>
-              <a:buChar char="•"/>
-            </a:pPr>
-            <a:r>
-              <a:rPr lang="en-GB" sz="2000" dirty="0">
-                <a:latin typeface="Arial"/>
-                <a:cs typeface="Arial"/>
-              </a:rPr>
-              <a:t>For that reason, even if you write items in a specific order when defining a dictionary, you should pretend that they are shuffled up straight after</a:t>
-            </a:r>
-          </a:p>
-          <a:p>
-            <a:pPr marL="342900" indent="-342900">
-              <a:buFont typeface="Arial"/>
-              <a:buChar char="•"/>
-            </a:pPr>
-            <a:r>
-              <a:rPr lang="en-GB" sz="2000" dirty="0">
-                <a:latin typeface="Arial"/>
-                <a:cs typeface="Arial"/>
-              </a:rPr>
-              <a:t>If you need to keep track of the order then Python offers an ordered dictionary, but this is rarely needed in practice</a:t>
-            </a:r>
-          </a:p>
-        </p:txBody>
-      </p:sp>
-      <p:pic>
-        <p:nvPicPr>
-          <p:cNvPr id="5" name="Picture 4">
-            <a:extLst>
-              <a:ext uri="{FF2B5EF4-FFF2-40B4-BE49-F238E27FC236}">
-                <a16:creationId xmlns:a16="http://schemas.microsoft.com/office/drawing/2014/main" id="{8F995554-EA27-46C4-9C45-C4897196B91E}"/>
-              </a:ext>
-            </a:extLst>
-          </p:cNvPr>
-          <p:cNvPicPr>
-            <a:picLocks noChangeAspect="1"/>
-          </p:cNvPicPr>
-          <p:nvPr/>
-        </p:nvPicPr>
-        <p:blipFill>
-          <a:blip r:embed="rId3"/>
-          <a:stretch>
-            <a:fillRect/>
-          </a:stretch>
-        </p:blipFill>
-        <p:spPr>
-          <a:xfrm>
-            <a:off x="1084207" y="2813382"/>
-            <a:ext cx="7071360" cy="1307997"/>
-          </a:xfrm>
-          <a:prstGeom prst="rect">
-            <a:avLst/>
-          </a:prstGeom>
-        </p:spPr>
-      </p:pic>
-    </p:spTree>
-    <p:extLst>
-      <p:ext uri="{BB962C8B-B14F-4D97-AF65-F5344CB8AC3E}">
-        <p14:creationId xmlns:p14="http://schemas.microsoft.com/office/powerpoint/2010/main" val="904237300"/>
-      </p:ext>
-    </p:extLst>
-  </p:cSld>
-  <p:clrMapOvr>
-    <a:masterClrMapping/>
-  </p:clrMapOvr>
-</p:sld>
-</file>
-
-<file path=ppt/slides/slide6.xml><?xml version="1.0" encoding="utf-8"?>
-<p:sld xmlns:a="http://schemas.openxmlformats.org/drawingml/2006/main" xmlns:r="http://schemas.openxmlformats.org/officeDocument/2006/relationships" xmlns:p="http://schemas.openxmlformats.org/presentationml/2006/main" showMasterSp="0">
-  <p:cSld>
-    <p:spTree>
-      <p:nvGrpSpPr>
-        <p:cNvPr id="1" name=""/>
-        <p:cNvGrpSpPr/>
-        <p:nvPr/>
-      </p:nvGrpSpPr>
-      <p:grpSpPr>
-        <a:xfrm>
-          <a:off x="0" y="0"/>
-          <a:ext cx="0" cy="0"/>
-          <a:chOff x="0" y="0"/>
-          <a:chExt cx="0" cy="0"/>
-        </a:xfrm>
-      </p:grpSpPr>
-      <p:sp>
-        <p:nvSpPr>
-          <p:cNvPr id="2" name="Title 1">
-            <a:extLst>
-              <a:ext uri="{FF2B5EF4-FFF2-40B4-BE49-F238E27FC236}">
-                <a16:creationId xmlns:a16="http://schemas.microsoft.com/office/drawing/2014/main" id="{F7DA9A4F-1DFD-49DB-8569-F5AB18BD6161}"/>
-              </a:ext>
-            </a:extLst>
-          </p:cNvPr>
-          <p:cNvSpPr>
-            <a:spLocks noGrp="1"/>
-          </p:cNvSpPr>
-          <p:nvPr>
-            <p:ph type="title"/>
-          </p:nvPr>
-        </p:nvSpPr>
-        <p:spPr/>
-        <p:txBody>
-          <a:bodyPr/>
-          <a:lstStyle/>
-          <a:p>
-            <a:r>
-              <a:rPr lang="en-GB" dirty="0"/>
-              <a:t>Dictionaries</a:t>
-            </a:r>
-          </a:p>
-        </p:txBody>
-      </p:sp>
-      <p:sp>
-        <p:nvSpPr>
-          <p:cNvPr id="3" name="Slide Number Placeholder 2">
-            <a:extLst>
-              <a:ext uri="{FF2B5EF4-FFF2-40B4-BE49-F238E27FC236}">
-                <a16:creationId xmlns:a16="http://schemas.microsoft.com/office/drawing/2014/main" id="{7C3E703A-A386-472F-AD27-D2D983CC7A66}"/>
-              </a:ext>
-            </a:extLst>
-          </p:cNvPr>
-          <p:cNvSpPr>
-            <a:spLocks noGrp="1"/>
-          </p:cNvSpPr>
-          <p:nvPr>
-            <p:ph type="sldNum" sz="quarter" idx="4"/>
-          </p:nvPr>
-        </p:nvSpPr>
-        <p:spPr/>
-        <p:txBody>
-          <a:bodyPr/>
-          <a:lstStyle/>
-          <a:p>
-            <a:fld id="{3C4F54F3-C349-4609-AFEE-01462D5C7942}" type="slidenum">
-              <a:rPr lang="en-GB" smtClean="0"/>
-              <a:pPr/>
-              <a:t>6</a:t>
             </a:fld>
             <a:endParaRPr lang="en-GB"/>
           </a:p>
@@ -33184,7 +32436,7 @@
 </p:sld>
 </file>
 
-<file path=ppt/slides/slide7.xml><?xml version="1.0" encoding="utf-8"?>
+<file path=ppt/slides/slide6.xml><?xml version="1.0" encoding="utf-8"?>
 <p:sld xmlns:a="http://schemas.openxmlformats.org/drawingml/2006/main" xmlns:r="http://schemas.openxmlformats.org/officeDocument/2006/relationships" xmlns:p="http://schemas.openxmlformats.org/presentationml/2006/main" showMasterSp="0">
   <p:cSld>
     <p:spTree>
@@ -33253,7 +32505,7 @@
             <a:fld id="{3C4F54F3-C349-4609-AFEE-01462D5C7942}" type="slidenum">
               <a:rPr lang="en-GB" smtClean="0"/>
               <a:pPr/>
-              <a:t>7</a:t>
+              <a:t>6</a:t>
             </a:fld>
             <a:endParaRPr lang="en-GB"/>
           </a:p>
@@ -33644,6 +32896,416 @@
     <p:extLst>
       <p:ext uri="{BB962C8B-B14F-4D97-AF65-F5344CB8AC3E}">
         <p14:creationId xmlns:p14="http://schemas.microsoft.com/office/powerpoint/2010/main" val="1343401856"/>
+      </p:ext>
+    </p:extLst>
+  </p:cSld>
+  <p:clrMapOvr>
+    <a:masterClrMapping/>
+  </p:clrMapOvr>
+</p:sld>
+</file>
+
+<file path=ppt/slides/slide7.xml><?xml version="1.0" encoding="utf-8"?>
+<p:sld xmlns:a="http://schemas.openxmlformats.org/drawingml/2006/main" xmlns:r="http://schemas.openxmlformats.org/officeDocument/2006/relationships" xmlns:p="http://schemas.openxmlformats.org/presentationml/2006/main" showMasterSp="0">
+  <p:cSld>
+    <p:spTree>
+      <p:nvGrpSpPr>
+        <p:cNvPr id="1" name=""/>
+        <p:cNvGrpSpPr/>
+        <p:nvPr/>
+      </p:nvGrpSpPr>
+      <p:grpSpPr>
+        <a:xfrm>
+          <a:off x="0" y="0"/>
+          <a:ext cx="0" cy="0"/>
+          <a:chOff x="0" y="0"/>
+          <a:chExt cx="0" cy="0"/>
+        </a:xfrm>
+      </p:grpSpPr>
+      <p:sp>
+        <p:nvSpPr>
+          <p:cNvPr id="2" name="Title 1">
+            <a:extLst>
+              <a:ext uri="{FF2B5EF4-FFF2-40B4-BE49-F238E27FC236}">
+                <a16:creationId xmlns:a16="http://schemas.microsoft.com/office/drawing/2014/main" id="{F7DA9A4F-1DFD-49DB-8569-F5AB18BD6161}"/>
+              </a:ext>
+            </a:extLst>
+          </p:cNvPr>
+          <p:cNvSpPr>
+            <a:spLocks noGrp="1"/>
+          </p:cNvSpPr>
+          <p:nvPr>
+            <p:ph type="title"/>
+          </p:nvPr>
+        </p:nvSpPr>
+        <p:spPr/>
+        <p:txBody>
+          <a:bodyPr/>
+          <a:lstStyle/>
+          <a:p>
+            <a:r>
+              <a:rPr lang="en-GB" dirty="0"/>
+              <a:t>Dictionaries Puzzles Solutions</a:t>
+            </a:r>
+          </a:p>
+        </p:txBody>
+      </p:sp>
+      <p:sp>
+        <p:nvSpPr>
+          <p:cNvPr id="3" name="Slide Number Placeholder 2">
+            <a:extLst>
+              <a:ext uri="{FF2B5EF4-FFF2-40B4-BE49-F238E27FC236}">
+                <a16:creationId xmlns:a16="http://schemas.microsoft.com/office/drawing/2014/main" id="{7C3E703A-A386-472F-AD27-D2D983CC7A66}"/>
+              </a:ext>
+            </a:extLst>
+          </p:cNvPr>
+          <p:cNvSpPr>
+            <a:spLocks noGrp="1"/>
+          </p:cNvSpPr>
+          <p:nvPr>
+            <p:ph type="sldNum" sz="quarter" idx="4"/>
+          </p:nvPr>
+        </p:nvSpPr>
+        <p:spPr/>
+        <p:txBody>
+          <a:bodyPr/>
+          <a:lstStyle/>
+          <a:p>
+            <a:fld id="{3C4F54F3-C349-4609-AFEE-01462D5C7942}" type="slidenum">
+              <a:rPr lang="en-GB" smtClean="0"/>
+              <a:pPr/>
+              <a:t>7</a:t>
+            </a:fld>
+            <a:endParaRPr lang="en-GB"/>
+          </a:p>
+        </p:txBody>
+      </p:sp>
+      <p:pic>
+        <p:nvPicPr>
+          <p:cNvPr id="11" name="Picture 10">
+            <a:extLst>
+              <a:ext uri="{FF2B5EF4-FFF2-40B4-BE49-F238E27FC236}">
+                <a16:creationId xmlns:a16="http://schemas.microsoft.com/office/drawing/2014/main" id="{AE10D547-F5D1-43D9-93EA-E166E3C73F57}"/>
+              </a:ext>
+            </a:extLst>
+          </p:cNvPr>
+          <p:cNvPicPr>
+            <a:picLocks noChangeAspect="1"/>
+          </p:cNvPicPr>
+          <p:nvPr/>
+        </p:nvPicPr>
+        <p:blipFill rotWithShape="1">
+          <a:blip r:embed="rId3"/>
+          <a:srcRect l="2982" t="3174" r="2869" b="2900"/>
+          <a:stretch/>
+        </p:blipFill>
+        <p:spPr>
+          <a:xfrm>
+            <a:off x="8576572" y="4598283"/>
+            <a:ext cx="498106" cy="496941"/>
+          </a:xfrm>
+          <a:prstGeom prst="ellipse">
+            <a:avLst/>
+          </a:prstGeom>
+        </p:spPr>
+      </p:pic>
+      <p:sp>
+        <p:nvSpPr>
+          <p:cNvPr id="6" name="Text Placeholder 2">
+            <a:extLst>
+              <a:ext uri="{FF2B5EF4-FFF2-40B4-BE49-F238E27FC236}">
+                <a16:creationId xmlns:a16="http://schemas.microsoft.com/office/drawing/2014/main" id="{28280EFD-605B-4843-8D20-931E34B69861}"/>
+              </a:ext>
+            </a:extLst>
+          </p:cNvPr>
+          <p:cNvSpPr txBox="1">
+            <a:spLocks/>
+          </p:cNvSpPr>
+          <p:nvPr/>
+        </p:nvSpPr>
+        <p:spPr>
+          <a:xfrm>
+            <a:off x="237061" y="712956"/>
+            <a:ext cx="8619938" cy="4295797"/>
+          </a:xfrm>
+          <a:prstGeom prst="rect">
+            <a:avLst/>
+          </a:prstGeom>
+        </p:spPr>
+        <p:txBody>
+          <a:bodyPr vert="horz" anchor="t"/>
+          <a:lstStyle>
+            <a:lvl1pPr marL="0" indent="0" algn="l" defTabSz="457200" rtl="0" eaLnBrk="1" latinLnBrk="0" hangingPunct="1">
+              <a:spcBef>
+                <a:spcPts val="0"/>
+              </a:spcBef>
+              <a:buFont typeface="Arial"/>
+              <a:buNone/>
+              <a:defRPr sz="2400" kern="1200" baseline="0">
+                <a:solidFill>
+                  <a:schemeClr val="tx1"/>
+                </a:solidFill>
+                <a:latin typeface="Arial" pitchFamily="34" charset="0"/>
+                <a:ea typeface="+mn-ea"/>
+                <a:cs typeface="Arial" pitchFamily="34" charset="0"/>
+              </a:defRPr>
+            </a:lvl1pPr>
+            <a:lvl2pPr marL="457200" indent="0" algn="l" defTabSz="457200" rtl="0" eaLnBrk="1" latinLnBrk="0" hangingPunct="1">
+              <a:spcBef>
+                <a:spcPct val="20000"/>
+              </a:spcBef>
+              <a:buFont typeface="Arial"/>
+              <a:buNone/>
+              <a:defRPr sz="2400" kern="1200">
+                <a:solidFill>
+                  <a:schemeClr val="tx1"/>
+                </a:solidFill>
+                <a:latin typeface="+mn-lt"/>
+                <a:ea typeface="+mn-ea"/>
+                <a:cs typeface="+mn-cs"/>
+              </a:defRPr>
+            </a:lvl2pPr>
+            <a:lvl3pPr marL="914400" indent="0" algn="l" defTabSz="457200" rtl="0" eaLnBrk="1" latinLnBrk="0" hangingPunct="1">
+              <a:spcBef>
+                <a:spcPct val="20000"/>
+              </a:spcBef>
+              <a:buFont typeface="Arial"/>
+              <a:buNone/>
+              <a:defRPr sz="2400" kern="1200">
+                <a:solidFill>
+                  <a:schemeClr val="tx1"/>
+                </a:solidFill>
+                <a:latin typeface="+mn-lt"/>
+                <a:ea typeface="+mn-ea"/>
+                <a:cs typeface="+mn-cs"/>
+              </a:defRPr>
+            </a:lvl3pPr>
+            <a:lvl4pPr marL="1371600" indent="0" algn="l" defTabSz="457200" rtl="0" eaLnBrk="1" latinLnBrk="0" hangingPunct="1">
+              <a:spcBef>
+                <a:spcPct val="20000"/>
+              </a:spcBef>
+              <a:buFont typeface="Arial"/>
+              <a:buNone/>
+              <a:defRPr sz="2400" kern="1200">
+                <a:solidFill>
+                  <a:schemeClr val="tx1"/>
+                </a:solidFill>
+                <a:latin typeface="+mn-lt"/>
+                <a:ea typeface="+mn-ea"/>
+                <a:cs typeface="+mn-cs"/>
+              </a:defRPr>
+            </a:lvl4pPr>
+            <a:lvl5pPr marL="1828800" indent="0" algn="l" defTabSz="457200" rtl="0" eaLnBrk="1" latinLnBrk="0" hangingPunct="1">
+              <a:spcBef>
+                <a:spcPct val="20000"/>
+              </a:spcBef>
+              <a:buFont typeface="Arial"/>
+              <a:buNone/>
+              <a:defRPr sz="2400" kern="1200">
+                <a:solidFill>
+                  <a:schemeClr val="tx1"/>
+                </a:solidFill>
+                <a:latin typeface="+mn-lt"/>
+                <a:ea typeface="+mn-ea"/>
+                <a:cs typeface="+mn-cs"/>
+              </a:defRPr>
+            </a:lvl5pPr>
+            <a:lvl6pPr marL="2514600" indent="-228600" algn="l" defTabSz="457200" rtl="0" eaLnBrk="1" latinLnBrk="0" hangingPunct="1">
+              <a:spcBef>
+                <a:spcPct val="20000"/>
+              </a:spcBef>
+              <a:buFont typeface="Arial"/>
+              <a:buChar char="•"/>
+              <a:defRPr sz="2000" kern="1200">
+                <a:solidFill>
+                  <a:schemeClr val="tx1"/>
+                </a:solidFill>
+                <a:latin typeface="+mn-lt"/>
+                <a:ea typeface="+mn-ea"/>
+                <a:cs typeface="+mn-cs"/>
+              </a:defRPr>
+            </a:lvl6pPr>
+            <a:lvl7pPr marL="2971800" indent="-228600" algn="l" defTabSz="457200" rtl="0" eaLnBrk="1" latinLnBrk="0" hangingPunct="1">
+              <a:spcBef>
+                <a:spcPct val="20000"/>
+              </a:spcBef>
+              <a:buFont typeface="Arial"/>
+              <a:buChar char="•"/>
+              <a:defRPr sz="2000" kern="1200">
+                <a:solidFill>
+                  <a:schemeClr val="tx1"/>
+                </a:solidFill>
+                <a:latin typeface="+mn-lt"/>
+                <a:ea typeface="+mn-ea"/>
+                <a:cs typeface="+mn-cs"/>
+              </a:defRPr>
+            </a:lvl7pPr>
+            <a:lvl8pPr marL="3429000" indent="-228600" algn="l" defTabSz="457200" rtl="0" eaLnBrk="1" latinLnBrk="0" hangingPunct="1">
+              <a:spcBef>
+                <a:spcPct val="20000"/>
+              </a:spcBef>
+              <a:buFont typeface="Arial"/>
+              <a:buChar char="•"/>
+              <a:defRPr sz="2000" kern="1200">
+                <a:solidFill>
+                  <a:schemeClr val="tx1"/>
+                </a:solidFill>
+                <a:latin typeface="+mn-lt"/>
+                <a:ea typeface="+mn-ea"/>
+                <a:cs typeface="+mn-cs"/>
+              </a:defRPr>
+            </a:lvl8pPr>
+            <a:lvl9pPr marL="3886200" indent="-228600" algn="l" defTabSz="457200" rtl="0" eaLnBrk="1" latinLnBrk="0" hangingPunct="1">
+              <a:spcBef>
+                <a:spcPct val="20000"/>
+              </a:spcBef>
+              <a:buFont typeface="Arial"/>
+              <a:buChar char="•"/>
+              <a:defRPr sz="2000" kern="1200">
+                <a:solidFill>
+                  <a:schemeClr val="tx1"/>
+                </a:solidFill>
+                <a:latin typeface="+mn-lt"/>
+                <a:ea typeface="+mn-ea"/>
+                <a:cs typeface="+mn-cs"/>
+              </a:defRPr>
+            </a:lvl9pPr>
+          </a:lstStyle>
+          <a:p>
+            <a:pPr marL="342900" indent="-342900">
+              <a:buFont typeface="Arial"/>
+              <a:buChar char="•"/>
+            </a:pPr>
+            <a:endParaRPr lang="en-GB" sz="2000" dirty="0">
+              <a:latin typeface="Arial"/>
+              <a:cs typeface="Arial"/>
+            </a:endParaRPr>
+          </a:p>
+          <a:p>
+            <a:pPr marL="342900" indent="-342900">
+              <a:buFont typeface="Arial"/>
+              <a:buChar char="•"/>
+            </a:pPr>
+            <a:endParaRPr lang="en-GB" sz="2000" dirty="0">
+              <a:latin typeface="Arial"/>
+              <a:cs typeface="Arial"/>
+            </a:endParaRPr>
+          </a:p>
+          <a:p>
+            <a:pPr marL="342900" indent="-342900">
+              <a:buFont typeface="Arial"/>
+              <a:buChar char="•"/>
+            </a:pPr>
+            <a:endParaRPr lang="en-GB" sz="2000" dirty="0">
+              <a:latin typeface="Arial"/>
+              <a:cs typeface="Arial"/>
+            </a:endParaRPr>
+          </a:p>
+          <a:p>
+            <a:pPr marL="342900" indent="-342900">
+              <a:buFont typeface="Arial"/>
+              <a:buChar char="•"/>
+            </a:pPr>
+            <a:endParaRPr lang="en-GB" sz="2000" dirty="0">
+              <a:latin typeface="Arial"/>
+              <a:cs typeface="Arial"/>
+            </a:endParaRPr>
+          </a:p>
+        </p:txBody>
+      </p:sp>
+      <p:pic>
+        <p:nvPicPr>
+          <p:cNvPr id="4" name="Picture 3">
+            <a:extLst>
+              <a:ext uri="{FF2B5EF4-FFF2-40B4-BE49-F238E27FC236}">
+                <a16:creationId xmlns:a16="http://schemas.microsoft.com/office/drawing/2014/main" id="{7D851FE5-8189-4072-B12F-A24B87B7AAFF}"/>
+              </a:ext>
+            </a:extLst>
+          </p:cNvPr>
+          <p:cNvPicPr>
+            <a:picLocks noChangeAspect="1"/>
+          </p:cNvPicPr>
+          <p:nvPr/>
+        </p:nvPicPr>
+        <p:blipFill rotWithShape="1">
+          <a:blip r:embed="rId4"/>
+          <a:srcRect t="-1" b="-1946"/>
+          <a:stretch/>
+        </p:blipFill>
+        <p:spPr>
+          <a:xfrm>
+            <a:off x="4673371" y="3581502"/>
+            <a:ext cx="3741992" cy="1117872"/>
+          </a:xfrm>
+          <a:prstGeom prst="rect">
+            <a:avLst/>
+          </a:prstGeom>
+        </p:spPr>
+      </p:pic>
+      <p:pic>
+        <p:nvPicPr>
+          <p:cNvPr id="5" name="Picture 4">
+            <a:extLst>
+              <a:ext uri="{FF2B5EF4-FFF2-40B4-BE49-F238E27FC236}">
+                <a16:creationId xmlns:a16="http://schemas.microsoft.com/office/drawing/2014/main" id="{ABDD66B2-7489-4BE1-A31C-EE43E1EC462D}"/>
+              </a:ext>
+            </a:extLst>
+          </p:cNvPr>
+          <p:cNvPicPr>
+            <a:picLocks noChangeAspect="1"/>
+          </p:cNvPicPr>
+          <p:nvPr/>
+        </p:nvPicPr>
+        <p:blipFill>
+          <a:blip r:embed="rId5"/>
+          <a:stretch>
+            <a:fillRect/>
+          </a:stretch>
+        </p:blipFill>
+        <p:spPr>
+          <a:xfrm>
+            <a:off x="516375" y="931251"/>
+            <a:ext cx="4156996" cy="1463675"/>
+          </a:xfrm>
+          <a:prstGeom prst="rect">
+            <a:avLst/>
+          </a:prstGeom>
+        </p:spPr>
+      </p:pic>
+      <p:pic>
+        <p:nvPicPr>
+          <p:cNvPr id="7" name="Picture 6">
+            <a:extLst>
+              <a:ext uri="{FF2B5EF4-FFF2-40B4-BE49-F238E27FC236}">
+                <a16:creationId xmlns:a16="http://schemas.microsoft.com/office/drawing/2014/main" id="{9476C6E6-6C22-4103-85B4-37F1475585F0}"/>
+              </a:ext>
+            </a:extLst>
+          </p:cNvPr>
+          <p:cNvPicPr>
+            <a:picLocks noChangeAspect="1"/>
+          </p:cNvPicPr>
+          <p:nvPr/>
+        </p:nvPicPr>
+        <p:blipFill>
+          <a:blip r:embed="rId6"/>
+          <a:stretch>
+            <a:fillRect/>
+          </a:stretch>
+        </p:blipFill>
+        <p:spPr>
+          <a:xfrm>
+            <a:off x="2319184" y="2519428"/>
+            <a:ext cx="4455692" cy="942257"/>
+          </a:xfrm>
+          <a:prstGeom prst="rect">
+            <a:avLst/>
+          </a:prstGeom>
+        </p:spPr>
+      </p:pic>
+    </p:spTree>
+    <p:extLst>
+      <p:ext uri="{BB962C8B-B14F-4D97-AF65-F5344CB8AC3E}">
+        <p14:creationId xmlns:p14="http://schemas.microsoft.com/office/powerpoint/2010/main" val="3894120066"/>
       </p:ext>
     </p:extLst>
   </p:cSld>
@@ -33693,7 +33355,7 @@
           <a:p>
             <a:r>
               <a:rPr lang="en-GB" dirty="0"/>
-              <a:t>Dictionaries Puzzles Solutions</a:t>
+              <a:t>Manipulating Dictionaries</a:t>
             </a:r>
           </a:p>
         </p:txBody>
@@ -33773,8 +33435,8 @@
         </p:nvSpPr>
         <p:spPr>
           <a:xfrm>
-            <a:off x="237061" y="712956"/>
-            <a:ext cx="8619938" cy="4295797"/>
+            <a:off x="237061" y="712957"/>
+            <a:ext cx="8619938" cy="2749572"/>
           </a:xfrm>
           <a:prstGeom prst="rect">
             <a:avLst/>
@@ -33924,10 +33586,13 @@
               <a:buFont typeface="Arial"/>
               <a:buChar char="•"/>
             </a:pPr>
-            <a:endParaRPr lang="en-GB" sz="2000" dirty="0">
-              <a:latin typeface="Arial"/>
-              <a:cs typeface="Arial"/>
-            </a:endParaRPr>
+            <a:r>
+              <a:rPr lang="en-GB" sz="2000" dirty="0">
+                <a:latin typeface="Arial"/>
+                <a:cs typeface="Arial"/>
+              </a:rPr>
+              <a:t>Just as with lists we can…</a:t>
+            </a:r>
           </a:p>
           <a:p>
             <a:pPr marL="342900" indent="-342900">
@@ -33959,6 +33624,536 @@
               <a:cs typeface="Arial"/>
             </a:endParaRPr>
           </a:p>
+          <a:p>
+            <a:pPr marL="342900" indent="-342900">
+              <a:buFont typeface="Arial"/>
+              <a:buChar char="•"/>
+            </a:pPr>
+            <a:endParaRPr lang="en-GB" sz="2000" dirty="0">
+              <a:latin typeface="Arial"/>
+              <a:cs typeface="Arial"/>
+            </a:endParaRPr>
+          </a:p>
+          <a:p>
+            <a:pPr marL="342900" indent="-342900">
+              <a:buFont typeface="Arial"/>
+              <a:buChar char="•"/>
+            </a:pPr>
+            <a:endParaRPr lang="en-GB" sz="2000" dirty="0">
+              <a:latin typeface="Arial"/>
+              <a:cs typeface="Arial"/>
+            </a:endParaRPr>
+          </a:p>
+          <a:p>
+            <a:pPr marL="342900" indent="-342900">
+              <a:buFont typeface="Arial"/>
+              <a:buChar char="•"/>
+            </a:pPr>
+            <a:endParaRPr lang="en-GB" sz="2000" dirty="0">
+              <a:latin typeface="Arial"/>
+              <a:cs typeface="Arial"/>
+            </a:endParaRPr>
+          </a:p>
+          <a:p>
+            <a:pPr marL="342900" indent="-342900">
+              <a:buFont typeface="Arial"/>
+              <a:buChar char="•"/>
+            </a:pPr>
+            <a:endParaRPr lang="en-GB" sz="2000" dirty="0">
+              <a:latin typeface="Arial"/>
+              <a:cs typeface="Arial"/>
+            </a:endParaRPr>
+          </a:p>
+        </p:txBody>
+      </p:sp>
+      <p:sp>
+        <p:nvSpPr>
+          <p:cNvPr id="9" name="Text Placeholder 2">
+            <a:extLst>
+              <a:ext uri="{FF2B5EF4-FFF2-40B4-BE49-F238E27FC236}">
+                <a16:creationId xmlns:a16="http://schemas.microsoft.com/office/drawing/2014/main" id="{691CF701-DFB4-4A3E-87BC-9675F593B146}"/>
+              </a:ext>
+            </a:extLst>
+          </p:cNvPr>
+          <p:cNvSpPr txBox="1">
+            <a:spLocks/>
+          </p:cNvSpPr>
+          <p:nvPr/>
+        </p:nvSpPr>
+        <p:spPr>
+          <a:xfrm>
+            <a:off x="5147663" y="2109738"/>
+            <a:ext cx="2928304" cy="2462457"/>
+          </a:xfrm>
+          <a:prstGeom prst="rect">
+            <a:avLst/>
+          </a:prstGeom>
+        </p:spPr>
+        <p:txBody>
+          <a:bodyPr vert="horz" anchor="t"/>
+          <a:lstStyle>
+            <a:lvl1pPr marL="0" indent="0" algn="l" defTabSz="457200" rtl="0" eaLnBrk="1" latinLnBrk="0" hangingPunct="1">
+              <a:spcBef>
+                <a:spcPts val="0"/>
+              </a:spcBef>
+              <a:buFont typeface="Arial"/>
+              <a:buNone/>
+              <a:defRPr sz="2400" kern="1200" baseline="0">
+                <a:solidFill>
+                  <a:schemeClr val="tx1"/>
+                </a:solidFill>
+                <a:latin typeface="Arial" pitchFamily="34" charset="0"/>
+                <a:ea typeface="+mn-ea"/>
+                <a:cs typeface="Arial" pitchFamily="34" charset="0"/>
+              </a:defRPr>
+            </a:lvl1pPr>
+            <a:lvl2pPr marL="457200" indent="0" algn="l" defTabSz="457200" rtl="0" eaLnBrk="1" latinLnBrk="0" hangingPunct="1">
+              <a:spcBef>
+                <a:spcPct val="20000"/>
+              </a:spcBef>
+              <a:buFont typeface="Arial"/>
+              <a:buNone/>
+              <a:defRPr sz="2400" kern="1200">
+                <a:solidFill>
+                  <a:schemeClr val="tx1"/>
+                </a:solidFill>
+                <a:latin typeface="+mn-lt"/>
+                <a:ea typeface="+mn-ea"/>
+                <a:cs typeface="+mn-cs"/>
+              </a:defRPr>
+            </a:lvl2pPr>
+            <a:lvl3pPr marL="914400" indent="0" algn="l" defTabSz="457200" rtl="0" eaLnBrk="1" latinLnBrk="0" hangingPunct="1">
+              <a:spcBef>
+                <a:spcPct val="20000"/>
+              </a:spcBef>
+              <a:buFont typeface="Arial"/>
+              <a:buNone/>
+              <a:defRPr sz="2400" kern="1200">
+                <a:solidFill>
+                  <a:schemeClr val="tx1"/>
+                </a:solidFill>
+                <a:latin typeface="+mn-lt"/>
+                <a:ea typeface="+mn-ea"/>
+                <a:cs typeface="+mn-cs"/>
+              </a:defRPr>
+            </a:lvl3pPr>
+            <a:lvl4pPr marL="1371600" indent="0" algn="l" defTabSz="457200" rtl="0" eaLnBrk="1" latinLnBrk="0" hangingPunct="1">
+              <a:spcBef>
+                <a:spcPct val="20000"/>
+              </a:spcBef>
+              <a:buFont typeface="Arial"/>
+              <a:buNone/>
+              <a:defRPr sz="2400" kern="1200">
+                <a:solidFill>
+                  <a:schemeClr val="tx1"/>
+                </a:solidFill>
+                <a:latin typeface="+mn-lt"/>
+                <a:ea typeface="+mn-ea"/>
+                <a:cs typeface="+mn-cs"/>
+              </a:defRPr>
+            </a:lvl4pPr>
+            <a:lvl5pPr marL="1828800" indent="0" algn="l" defTabSz="457200" rtl="0" eaLnBrk="1" latinLnBrk="0" hangingPunct="1">
+              <a:spcBef>
+                <a:spcPct val="20000"/>
+              </a:spcBef>
+              <a:buFont typeface="Arial"/>
+              <a:buNone/>
+              <a:defRPr sz="2400" kern="1200">
+                <a:solidFill>
+                  <a:schemeClr val="tx1"/>
+                </a:solidFill>
+                <a:latin typeface="+mn-lt"/>
+                <a:ea typeface="+mn-ea"/>
+                <a:cs typeface="+mn-cs"/>
+              </a:defRPr>
+            </a:lvl5pPr>
+            <a:lvl6pPr marL="2514600" indent="-228600" algn="l" defTabSz="457200" rtl="0" eaLnBrk="1" latinLnBrk="0" hangingPunct="1">
+              <a:spcBef>
+                <a:spcPct val="20000"/>
+              </a:spcBef>
+              <a:buFont typeface="Arial"/>
+              <a:buChar char="•"/>
+              <a:defRPr sz="2000" kern="1200">
+                <a:solidFill>
+                  <a:schemeClr val="tx1"/>
+                </a:solidFill>
+                <a:latin typeface="+mn-lt"/>
+                <a:ea typeface="+mn-ea"/>
+                <a:cs typeface="+mn-cs"/>
+              </a:defRPr>
+            </a:lvl6pPr>
+            <a:lvl7pPr marL="2971800" indent="-228600" algn="l" defTabSz="457200" rtl="0" eaLnBrk="1" latinLnBrk="0" hangingPunct="1">
+              <a:spcBef>
+                <a:spcPct val="20000"/>
+              </a:spcBef>
+              <a:buFont typeface="Arial"/>
+              <a:buChar char="•"/>
+              <a:defRPr sz="2000" kern="1200">
+                <a:solidFill>
+                  <a:schemeClr val="tx1"/>
+                </a:solidFill>
+                <a:latin typeface="+mn-lt"/>
+                <a:ea typeface="+mn-ea"/>
+                <a:cs typeface="+mn-cs"/>
+              </a:defRPr>
+            </a:lvl7pPr>
+            <a:lvl8pPr marL="3429000" indent="-228600" algn="l" defTabSz="457200" rtl="0" eaLnBrk="1" latinLnBrk="0" hangingPunct="1">
+              <a:spcBef>
+                <a:spcPct val="20000"/>
+              </a:spcBef>
+              <a:buFont typeface="Arial"/>
+              <a:buChar char="•"/>
+              <a:defRPr sz="2000" kern="1200">
+                <a:solidFill>
+                  <a:schemeClr val="tx1"/>
+                </a:solidFill>
+                <a:latin typeface="+mn-lt"/>
+                <a:ea typeface="+mn-ea"/>
+                <a:cs typeface="+mn-cs"/>
+              </a:defRPr>
+            </a:lvl8pPr>
+            <a:lvl9pPr marL="3886200" indent="-228600" algn="l" defTabSz="457200" rtl="0" eaLnBrk="1" latinLnBrk="0" hangingPunct="1">
+              <a:spcBef>
+                <a:spcPct val="20000"/>
+              </a:spcBef>
+              <a:buFont typeface="Arial"/>
+              <a:buChar char="•"/>
+              <a:defRPr sz="2000" kern="1200">
+                <a:solidFill>
+                  <a:schemeClr val="tx1"/>
+                </a:solidFill>
+                <a:latin typeface="+mn-lt"/>
+                <a:ea typeface="+mn-ea"/>
+                <a:cs typeface="+mn-cs"/>
+              </a:defRPr>
+            </a:lvl9pPr>
+          </a:lstStyle>
+          <a:p>
+            <a:pPr marL="342900" indent="-342900">
+              <a:buFont typeface="Arial"/>
+              <a:buChar char="•"/>
+            </a:pPr>
+            <a:r>
+              <a:rPr lang="en-GB" sz="1400" dirty="0">
+                <a:latin typeface="Arial"/>
+                <a:cs typeface="Arial"/>
+              </a:rPr>
+              <a:t>Overwrite a value</a:t>
+            </a:r>
+          </a:p>
+          <a:p>
+            <a:pPr marL="342900" indent="-342900">
+              <a:buFont typeface="Arial"/>
+              <a:buChar char="•"/>
+            </a:pPr>
+            <a:endParaRPr lang="en-GB" sz="1400" dirty="0">
+              <a:latin typeface="Arial"/>
+              <a:cs typeface="Arial"/>
+            </a:endParaRPr>
+          </a:p>
+          <a:p>
+            <a:pPr marL="342900" indent="-342900">
+              <a:buFont typeface="Arial"/>
+              <a:buChar char="•"/>
+            </a:pPr>
+            <a:endParaRPr lang="en-GB" sz="1400" dirty="0">
+              <a:latin typeface="Arial"/>
+              <a:cs typeface="Arial"/>
+            </a:endParaRPr>
+          </a:p>
+          <a:p>
+            <a:pPr marL="342900" indent="-342900">
+              <a:buFont typeface="Arial"/>
+              <a:buChar char="•"/>
+            </a:pPr>
+            <a:endParaRPr lang="en-GB" sz="1400" dirty="0">
+              <a:latin typeface="Arial"/>
+              <a:cs typeface="Arial"/>
+            </a:endParaRPr>
+          </a:p>
+          <a:p>
+            <a:pPr marL="342900" indent="-342900">
+              <a:buFont typeface="Arial"/>
+              <a:buChar char="•"/>
+            </a:pPr>
+            <a:endParaRPr lang="en-GB" sz="1400" dirty="0">
+              <a:latin typeface="Arial"/>
+              <a:cs typeface="Arial"/>
+            </a:endParaRPr>
+          </a:p>
+          <a:p>
+            <a:pPr marL="342900" indent="-342900">
+              <a:buFont typeface="Arial"/>
+              <a:buChar char="•"/>
+            </a:pPr>
+            <a:endParaRPr lang="en-GB" sz="1400" dirty="0">
+              <a:latin typeface="Arial"/>
+              <a:cs typeface="Arial"/>
+            </a:endParaRPr>
+          </a:p>
+          <a:p>
+            <a:pPr marL="342900" indent="-342900">
+              <a:buFont typeface="Arial"/>
+              <a:buChar char="•"/>
+            </a:pPr>
+            <a:endParaRPr lang="en-GB" sz="1400" dirty="0">
+              <a:latin typeface="Arial"/>
+              <a:cs typeface="Arial"/>
+            </a:endParaRPr>
+          </a:p>
+          <a:p>
+            <a:pPr marL="342900" indent="-342900">
+              <a:buFont typeface="Arial"/>
+              <a:buChar char="•"/>
+            </a:pPr>
+            <a:r>
+              <a:rPr lang="en-GB" sz="1400" dirty="0">
+                <a:latin typeface="Arial"/>
+                <a:cs typeface="Arial"/>
+              </a:rPr>
+              <a:t>Deleting an item by value is a bit tougher — we will look at doing this in the homework sheet </a:t>
+            </a:r>
+          </a:p>
+        </p:txBody>
+      </p:sp>
+      <p:sp>
+        <p:nvSpPr>
+          <p:cNvPr id="13" name="Text Placeholder 2">
+            <a:extLst>
+              <a:ext uri="{FF2B5EF4-FFF2-40B4-BE49-F238E27FC236}">
+                <a16:creationId xmlns:a16="http://schemas.microsoft.com/office/drawing/2014/main" id="{B49F9675-3016-456A-9429-C7A31BF54FAD}"/>
+              </a:ext>
+            </a:extLst>
+          </p:cNvPr>
+          <p:cNvSpPr txBox="1">
+            <a:spLocks/>
+          </p:cNvSpPr>
+          <p:nvPr/>
+        </p:nvSpPr>
+        <p:spPr>
+          <a:xfrm>
+            <a:off x="768431" y="2135825"/>
+            <a:ext cx="4168640" cy="2462457"/>
+          </a:xfrm>
+          <a:prstGeom prst="rect">
+            <a:avLst/>
+          </a:prstGeom>
+        </p:spPr>
+        <p:txBody>
+          <a:bodyPr vert="horz" anchor="t"/>
+          <a:lstStyle>
+            <a:lvl1pPr marL="0" indent="0" algn="l" defTabSz="457200" rtl="0" eaLnBrk="1" latinLnBrk="0" hangingPunct="1">
+              <a:spcBef>
+                <a:spcPts val="0"/>
+              </a:spcBef>
+              <a:buFont typeface="Arial"/>
+              <a:buNone/>
+              <a:defRPr sz="2400" kern="1200" baseline="0">
+                <a:solidFill>
+                  <a:schemeClr val="tx1"/>
+                </a:solidFill>
+                <a:latin typeface="Arial" pitchFamily="34" charset="0"/>
+                <a:ea typeface="+mn-ea"/>
+                <a:cs typeface="Arial" pitchFamily="34" charset="0"/>
+              </a:defRPr>
+            </a:lvl1pPr>
+            <a:lvl2pPr marL="457200" indent="0" algn="l" defTabSz="457200" rtl="0" eaLnBrk="1" latinLnBrk="0" hangingPunct="1">
+              <a:spcBef>
+                <a:spcPct val="20000"/>
+              </a:spcBef>
+              <a:buFont typeface="Arial"/>
+              <a:buNone/>
+              <a:defRPr sz="2400" kern="1200">
+                <a:solidFill>
+                  <a:schemeClr val="tx1"/>
+                </a:solidFill>
+                <a:latin typeface="+mn-lt"/>
+                <a:ea typeface="+mn-ea"/>
+                <a:cs typeface="+mn-cs"/>
+              </a:defRPr>
+            </a:lvl2pPr>
+            <a:lvl3pPr marL="914400" indent="0" algn="l" defTabSz="457200" rtl="0" eaLnBrk="1" latinLnBrk="0" hangingPunct="1">
+              <a:spcBef>
+                <a:spcPct val="20000"/>
+              </a:spcBef>
+              <a:buFont typeface="Arial"/>
+              <a:buNone/>
+              <a:defRPr sz="2400" kern="1200">
+                <a:solidFill>
+                  <a:schemeClr val="tx1"/>
+                </a:solidFill>
+                <a:latin typeface="+mn-lt"/>
+                <a:ea typeface="+mn-ea"/>
+                <a:cs typeface="+mn-cs"/>
+              </a:defRPr>
+            </a:lvl3pPr>
+            <a:lvl4pPr marL="1371600" indent="0" algn="l" defTabSz="457200" rtl="0" eaLnBrk="1" latinLnBrk="0" hangingPunct="1">
+              <a:spcBef>
+                <a:spcPct val="20000"/>
+              </a:spcBef>
+              <a:buFont typeface="Arial"/>
+              <a:buNone/>
+              <a:defRPr sz="2400" kern="1200">
+                <a:solidFill>
+                  <a:schemeClr val="tx1"/>
+                </a:solidFill>
+                <a:latin typeface="+mn-lt"/>
+                <a:ea typeface="+mn-ea"/>
+                <a:cs typeface="+mn-cs"/>
+              </a:defRPr>
+            </a:lvl4pPr>
+            <a:lvl5pPr marL="1828800" indent="0" algn="l" defTabSz="457200" rtl="0" eaLnBrk="1" latinLnBrk="0" hangingPunct="1">
+              <a:spcBef>
+                <a:spcPct val="20000"/>
+              </a:spcBef>
+              <a:buFont typeface="Arial"/>
+              <a:buNone/>
+              <a:defRPr sz="2400" kern="1200">
+                <a:solidFill>
+                  <a:schemeClr val="tx1"/>
+                </a:solidFill>
+                <a:latin typeface="+mn-lt"/>
+                <a:ea typeface="+mn-ea"/>
+                <a:cs typeface="+mn-cs"/>
+              </a:defRPr>
+            </a:lvl5pPr>
+            <a:lvl6pPr marL="2514600" indent="-228600" algn="l" defTabSz="457200" rtl="0" eaLnBrk="1" latinLnBrk="0" hangingPunct="1">
+              <a:spcBef>
+                <a:spcPct val="20000"/>
+              </a:spcBef>
+              <a:buFont typeface="Arial"/>
+              <a:buChar char="•"/>
+              <a:defRPr sz="2000" kern="1200">
+                <a:solidFill>
+                  <a:schemeClr val="tx1"/>
+                </a:solidFill>
+                <a:latin typeface="+mn-lt"/>
+                <a:ea typeface="+mn-ea"/>
+                <a:cs typeface="+mn-cs"/>
+              </a:defRPr>
+            </a:lvl6pPr>
+            <a:lvl7pPr marL="2971800" indent="-228600" algn="l" defTabSz="457200" rtl="0" eaLnBrk="1" latinLnBrk="0" hangingPunct="1">
+              <a:spcBef>
+                <a:spcPct val="20000"/>
+              </a:spcBef>
+              <a:buFont typeface="Arial"/>
+              <a:buChar char="•"/>
+              <a:defRPr sz="2000" kern="1200">
+                <a:solidFill>
+                  <a:schemeClr val="tx1"/>
+                </a:solidFill>
+                <a:latin typeface="+mn-lt"/>
+                <a:ea typeface="+mn-ea"/>
+                <a:cs typeface="+mn-cs"/>
+              </a:defRPr>
+            </a:lvl7pPr>
+            <a:lvl8pPr marL="3429000" indent="-228600" algn="l" defTabSz="457200" rtl="0" eaLnBrk="1" latinLnBrk="0" hangingPunct="1">
+              <a:spcBef>
+                <a:spcPct val="20000"/>
+              </a:spcBef>
+              <a:buFont typeface="Arial"/>
+              <a:buChar char="•"/>
+              <a:defRPr sz="2000" kern="1200">
+                <a:solidFill>
+                  <a:schemeClr val="tx1"/>
+                </a:solidFill>
+                <a:latin typeface="+mn-lt"/>
+                <a:ea typeface="+mn-ea"/>
+                <a:cs typeface="+mn-cs"/>
+              </a:defRPr>
+            </a:lvl8pPr>
+            <a:lvl9pPr marL="3886200" indent="-228600" algn="l" defTabSz="457200" rtl="0" eaLnBrk="1" latinLnBrk="0" hangingPunct="1">
+              <a:spcBef>
+                <a:spcPct val="20000"/>
+              </a:spcBef>
+              <a:buFont typeface="Arial"/>
+              <a:buChar char="•"/>
+              <a:defRPr sz="2000" kern="1200">
+                <a:solidFill>
+                  <a:schemeClr val="tx1"/>
+                </a:solidFill>
+                <a:latin typeface="+mn-lt"/>
+                <a:ea typeface="+mn-ea"/>
+                <a:cs typeface="+mn-cs"/>
+              </a:defRPr>
+            </a:lvl9pPr>
+          </a:lstStyle>
+          <a:p>
+            <a:pPr marL="342900" indent="-342900">
+              <a:buFont typeface="Arial"/>
+              <a:buChar char="•"/>
+            </a:pPr>
+            <a:r>
+              <a:rPr lang="en-GB" sz="1400" dirty="0">
+                <a:latin typeface="Arial"/>
+                <a:cs typeface="Arial"/>
+              </a:rPr>
+              <a:t>Add a new item</a:t>
+            </a:r>
+          </a:p>
+          <a:p>
+            <a:pPr marL="342900" indent="-342900">
+              <a:buFont typeface="Arial"/>
+              <a:buChar char="•"/>
+            </a:pPr>
+            <a:endParaRPr lang="en-GB" sz="1400" dirty="0">
+              <a:latin typeface="Arial"/>
+              <a:cs typeface="Arial"/>
+            </a:endParaRPr>
+          </a:p>
+          <a:p>
+            <a:pPr marL="342900" indent="-342900">
+              <a:buFont typeface="Arial"/>
+              <a:buChar char="•"/>
+            </a:pPr>
+            <a:endParaRPr lang="en-GB" sz="1400" dirty="0">
+              <a:latin typeface="Arial"/>
+              <a:cs typeface="Arial"/>
+            </a:endParaRPr>
+          </a:p>
+          <a:p>
+            <a:pPr marL="342900" indent="-342900">
+              <a:buFont typeface="Arial"/>
+              <a:buChar char="•"/>
+            </a:pPr>
+            <a:endParaRPr lang="en-GB" sz="1400" dirty="0">
+              <a:latin typeface="Arial"/>
+              <a:cs typeface="Arial"/>
+            </a:endParaRPr>
+          </a:p>
+          <a:p>
+            <a:pPr marL="342900" indent="-342900">
+              <a:buFont typeface="Arial"/>
+              <a:buChar char="•"/>
+            </a:pPr>
+            <a:endParaRPr lang="en-GB" sz="1400" dirty="0">
+              <a:latin typeface="Arial"/>
+              <a:cs typeface="Arial"/>
+            </a:endParaRPr>
+          </a:p>
+          <a:p>
+            <a:pPr marL="342900" indent="-342900">
+              <a:buFont typeface="Arial"/>
+              <a:buChar char="•"/>
+            </a:pPr>
+            <a:endParaRPr lang="en-GB" sz="1400" dirty="0">
+              <a:latin typeface="Arial"/>
+              <a:cs typeface="Arial"/>
+            </a:endParaRPr>
+          </a:p>
+          <a:p>
+            <a:pPr marL="342900" indent="-342900">
+              <a:buFont typeface="Arial"/>
+              <a:buChar char="•"/>
+            </a:pPr>
+            <a:r>
+              <a:rPr lang="en-GB" sz="1400" dirty="0">
+                <a:latin typeface="Arial"/>
+                <a:cs typeface="Arial"/>
+              </a:rPr>
+              <a:t>Delete an item by key</a:t>
+            </a:r>
+          </a:p>
         </p:txBody>
       </p:sp>
       <p:pic>
@@ -33966,7 +34161,7 @@
           <p:cNvPr id="4" name="Picture 3">
             <a:extLst>
               <a:ext uri="{FF2B5EF4-FFF2-40B4-BE49-F238E27FC236}">
-                <a16:creationId xmlns:a16="http://schemas.microsoft.com/office/drawing/2014/main" id="{7D851FE5-8189-4072-B12F-A24B87B7AAFF}"/>
+                <a16:creationId xmlns:a16="http://schemas.microsoft.com/office/drawing/2014/main" id="{3FD2770E-8D78-4B1F-95E7-D3596376F277}"/>
               </a:ext>
             </a:extLst>
           </p:cNvPr>
@@ -33975,15 +34170,16 @@
           </p:cNvPicPr>
           <p:nvPr/>
         </p:nvPicPr>
-        <p:blipFill rotWithShape="1">
+        <p:blipFill>
           <a:blip r:embed="rId4"/>
-          <a:srcRect t="-1" b="-1946"/>
-          <a:stretch/>
+          <a:stretch>
+            <a:fillRect/>
+          </a:stretch>
         </p:blipFill>
         <p:spPr>
           <a:xfrm>
-            <a:off x="4673371" y="3581502"/>
-            <a:ext cx="3741992" cy="1117872"/>
+            <a:off x="2464566" y="1357637"/>
+            <a:ext cx="4168641" cy="483464"/>
           </a:xfrm>
           <a:prstGeom prst="rect">
             <a:avLst/>
@@ -33992,10 +34188,10 @@
       </p:pic>
       <p:pic>
         <p:nvPicPr>
-          <p:cNvPr id="5" name="Picture 4">
+          <p:cNvPr id="7" name="Picture 6">
             <a:extLst>
               <a:ext uri="{FF2B5EF4-FFF2-40B4-BE49-F238E27FC236}">
-                <a16:creationId xmlns:a16="http://schemas.microsoft.com/office/drawing/2014/main" id="{ABDD66B2-7489-4BE1-A31C-EE43E1EC462D}"/>
+                <a16:creationId xmlns:a16="http://schemas.microsoft.com/office/drawing/2014/main" id="{F5333401-0C60-40D7-BA94-AD1ECB9122A2}"/>
               </a:ext>
             </a:extLst>
           </p:cNvPr>
@@ -34012,8 +34208,8 @@
         </p:blipFill>
         <p:spPr>
           <a:xfrm>
-            <a:off x="516375" y="931251"/>
-            <a:ext cx="4156996" cy="1463675"/>
+            <a:off x="1378214" y="2510165"/>
+            <a:ext cx="2583093" cy="826198"/>
           </a:xfrm>
           <a:prstGeom prst="rect">
             <a:avLst/>
@@ -34022,10 +34218,10 @@
       </p:pic>
       <p:pic>
         <p:nvPicPr>
-          <p:cNvPr id="7" name="Picture 6">
+          <p:cNvPr id="8" name="Picture 7">
             <a:extLst>
               <a:ext uri="{FF2B5EF4-FFF2-40B4-BE49-F238E27FC236}">
-                <a16:creationId xmlns:a16="http://schemas.microsoft.com/office/drawing/2014/main" id="{9476C6E6-6C22-4103-85B4-37F1475585F0}"/>
+                <a16:creationId xmlns:a16="http://schemas.microsoft.com/office/drawing/2014/main" id="{7F16399D-6BA8-46E9-901C-BFEE279AA2B4}"/>
               </a:ext>
             </a:extLst>
           </p:cNvPr>
@@ -34042,8 +34238,38 @@
         </p:blipFill>
         <p:spPr>
           <a:xfrm>
-            <a:off x="2319184" y="2519428"/>
-            <a:ext cx="4455692" cy="942257"/>
+            <a:off x="1378214" y="3773724"/>
+            <a:ext cx="1443805" cy="824558"/>
+          </a:xfrm>
+          <a:prstGeom prst="rect">
+            <a:avLst/>
+          </a:prstGeom>
+        </p:spPr>
+      </p:pic>
+      <p:pic>
+        <p:nvPicPr>
+          <p:cNvPr id="14" name="Picture 13">
+            <a:extLst>
+              <a:ext uri="{FF2B5EF4-FFF2-40B4-BE49-F238E27FC236}">
+                <a16:creationId xmlns:a16="http://schemas.microsoft.com/office/drawing/2014/main" id="{38ECDF29-E276-45DD-8EFC-6CF0BF453A19}"/>
+              </a:ext>
+            </a:extLst>
+          </p:cNvPr>
+          <p:cNvPicPr>
+            <a:picLocks noChangeAspect="1"/>
+          </p:cNvPicPr>
+          <p:nvPr/>
+        </p:nvPicPr>
+        <p:blipFill>
+          <a:blip r:embed="rId7"/>
+          <a:stretch>
+            <a:fillRect/>
+          </a:stretch>
+        </p:blipFill>
+        <p:spPr>
+          <a:xfrm>
+            <a:off x="5262608" y="2510165"/>
+            <a:ext cx="2928304" cy="751081"/>
           </a:xfrm>
           <a:prstGeom prst="rect">
             <a:avLst/>
@@ -34053,7 +34279,7 @@
     </p:spTree>
     <p:extLst>
       <p:ext uri="{BB962C8B-B14F-4D97-AF65-F5344CB8AC3E}">
-        <p14:creationId xmlns:p14="http://schemas.microsoft.com/office/powerpoint/2010/main" val="3894120066"/>
+        <p14:creationId xmlns:p14="http://schemas.microsoft.com/office/powerpoint/2010/main" val="950536162"/>
       </p:ext>
     </p:extLst>
   </p:cSld>
@@ -34103,7 +34329,7 @@
           <a:p>
             <a:r>
               <a:rPr lang="en-GB" dirty="0"/>
-              <a:t>Manipulating Dictionaries</a:t>
+              <a:t>Manipulating Dictionaries Puzzles</a:t>
             </a:r>
           </a:p>
         </p:txBody>
@@ -34183,8 +34409,8 @@
         </p:nvSpPr>
         <p:spPr>
           <a:xfrm>
-            <a:off x="237061" y="712957"/>
-            <a:ext cx="8619938" cy="2749572"/>
+            <a:off x="237061" y="712956"/>
+            <a:ext cx="8619938" cy="3749315"/>
           </a:xfrm>
           <a:prstGeom prst="rect">
             <a:avLst/>
@@ -34339,7 +34565,20 @@
                 <a:latin typeface="Arial"/>
                 <a:cs typeface="Arial"/>
               </a:rPr>
-              <a:t>Just as with lists we can…</a:t>
+              <a:t>Create a dictionary containing with keys ‘one’, ‘two’, and ‘three’ which corresponding values 1, 2, and 4</a:t>
+            </a:r>
+          </a:p>
+          <a:p>
+            <a:pPr marL="342900" indent="-342900">
+              <a:buFont typeface="Arial"/>
+              <a:buChar char="•"/>
+            </a:pPr>
+            <a:r>
+              <a:rPr lang="en-GB" sz="2000" dirty="0">
+                <a:latin typeface="Arial"/>
+                <a:cs typeface="Arial"/>
+              </a:rPr>
+              <a:t>Correct the value for key ‘three’ to be 3 and add a new pair ‘four’: 4</a:t>
             </a:r>
           </a:p>
           <a:p>
@@ -34357,10 +34596,33 @@
               <a:buFont typeface="Arial"/>
               <a:buChar char="•"/>
             </a:pPr>
-            <a:endParaRPr lang="en-GB" sz="2000" dirty="0">
-              <a:latin typeface="Arial"/>
-              <a:cs typeface="Arial"/>
-            </a:endParaRPr>
+            <a:r>
+              <a:rPr lang="en-GB" sz="2000" dirty="0">
+                <a:latin typeface="Arial"/>
+                <a:cs typeface="Arial"/>
+              </a:rPr>
+              <a:t>Create an empty dictionary called </a:t>
+            </a:r>
+            <a:r>
+              <a:rPr lang="en-GB" sz="2000" dirty="0">
+                <a:latin typeface="Consolas" panose="020B0609020204030204" pitchFamily="49" charset="0"/>
+                <a:cs typeface="Arial"/>
+              </a:rPr>
+              <a:t>square</a:t>
+            </a:r>
+          </a:p>
+          <a:p>
+            <a:pPr marL="342900" indent="-342900">
+              <a:buFont typeface="Arial"/>
+              <a:buChar char="•"/>
+            </a:pPr>
+            <a:r>
+              <a:rPr lang="en-GB" sz="2000" dirty="0">
+                <a:latin typeface="Arial"/>
+                <a:cs typeface="Arial"/>
+              </a:rPr>
+              <a:t>Loop through the range -5 to 5 (inclusive), each time adding an item to the dictionary which maps the looping variable to its square</a:t>
+            </a:r>
           </a:p>
           <a:p>
             <a:pPr marL="342900" indent="-342900">
@@ -34377,7 +34639,21 @@
               <a:buFont typeface="Arial"/>
               <a:buChar char="•"/>
             </a:pPr>
-            <a:endParaRPr lang="en-GB" sz="2000" dirty="0">
+            <a:r>
+              <a:rPr lang="en-GB" sz="2000" b="1" dirty="0">
+                <a:latin typeface="Arial"/>
+                <a:cs typeface="Arial"/>
+              </a:rPr>
+              <a:t>Bonus: </a:t>
+            </a:r>
+            <a:r>
+              <a:rPr lang="en-GB" sz="2000" dirty="0">
+                <a:latin typeface="Arial"/>
+                <a:cs typeface="Arial"/>
+              </a:rPr>
+              <a:t>Create a dictionary called employees which contains two dictionaries, each giving the details (say, job title and manager) of a different employee. Access the manager of one of the employees</a:t>
+            </a:r>
+            <a:endParaRPr lang="en-GB" sz="2000" b="1" dirty="0">
               <a:latin typeface="Arial"/>
               <a:cs typeface="Arial"/>
             </a:endParaRPr>
@@ -34412,189 +34688,22 @@
               <a:cs typeface="Arial"/>
             </a:endParaRPr>
           </a:p>
-        </p:txBody>
-      </p:sp>
-      <p:sp>
-        <p:nvSpPr>
-          <p:cNvPr id="9" name="Text Placeholder 2">
-            <a:extLst>
-              <a:ext uri="{FF2B5EF4-FFF2-40B4-BE49-F238E27FC236}">
-                <a16:creationId xmlns:a16="http://schemas.microsoft.com/office/drawing/2014/main" id="{691CF701-DFB4-4A3E-87BC-9675F593B146}"/>
-              </a:ext>
-            </a:extLst>
-          </p:cNvPr>
-          <p:cNvSpPr txBox="1">
-            <a:spLocks/>
-          </p:cNvSpPr>
-          <p:nvPr/>
-        </p:nvSpPr>
-        <p:spPr>
-          <a:xfrm>
-            <a:off x="5147663" y="2109738"/>
-            <a:ext cx="2928304" cy="2462457"/>
-          </a:xfrm>
-          <a:prstGeom prst="rect">
-            <a:avLst/>
-          </a:prstGeom>
-        </p:spPr>
-        <p:txBody>
-          <a:bodyPr vert="horz" anchor="t"/>
-          <a:lstStyle>
-            <a:lvl1pPr marL="0" indent="0" algn="l" defTabSz="457200" rtl="0" eaLnBrk="1" latinLnBrk="0" hangingPunct="1">
-              <a:spcBef>
-                <a:spcPts val="0"/>
-              </a:spcBef>
-              <a:buFont typeface="Arial"/>
-              <a:buNone/>
-              <a:defRPr sz="2400" kern="1200" baseline="0">
-                <a:solidFill>
-                  <a:schemeClr val="tx1"/>
-                </a:solidFill>
-                <a:latin typeface="Arial" pitchFamily="34" charset="0"/>
-                <a:ea typeface="+mn-ea"/>
-                <a:cs typeface="Arial" pitchFamily="34" charset="0"/>
-              </a:defRPr>
-            </a:lvl1pPr>
-            <a:lvl2pPr marL="457200" indent="0" algn="l" defTabSz="457200" rtl="0" eaLnBrk="1" latinLnBrk="0" hangingPunct="1">
-              <a:spcBef>
-                <a:spcPct val="20000"/>
-              </a:spcBef>
-              <a:buFont typeface="Arial"/>
-              <a:buNone/>
-              <a:defRPr sz="2400" kern="1200">
-                <a:solidFill>
-                  <a:schemeClr val="tx1"/>
-                </a:solidFill>
-                <a:latin typeface="+mn-lt"/>
-                <a:ea typeface="+mn-ea"/>
-                <a:cs typeface="+mn-cs"/>
-              </a:defRPr>
-            </a:lvl2pPr>
-            <a:lvl3pPr marL="914400" indent="0" algn="l" defTabSz="457200" rtl="0" eaLnBrk="1" latinLnBrk="0" hangingPunct="1">
-              <a:spcBef>
-                <a:spcPct val="20000"/>
-              </a:spcBef>
-              <a:buFont typeface="Arial"/>
-              <a:buNone/>
-              <a:defRPr sz="2400" kern="1200">
-                <a:solidFill>
-                  <a:schemeClr val="tx1"/>
-                </a:solidFill>
-                <a:latin typeface="+mn-lt"/>
-                <a:ea typeface="+mn-ea"/>
-                <a:cs typeface="+mn-cs"/>
-              </a:defRPr>
-            </a:lvl3pPr>
-            <a:lvl4pPr marL="1371600" indent="0" algn="l" defTabSz="457200" rtl="0" eaLnBrk="1" latinLnBrk="0" hangingPunct="1">
-              <a:spcBef>
-                <a:spcPct val="20000"/>
-              </a:spcBef>
-              <a:buFont typeface="Arial"/>
-              <a:buNone/>
-              <a:defRPr sz="2400" kern="1200">
-                <a:solidFill>
-                  <a:schemeClr val="tx1"/>
-                </a:solidFill>
-                <a:latin typeface="+mn-lt"/>
-                <a:ea typeface="+mn-ea"/>
-                <a:cs typeface="+mn-cs"/>
-              </a:defRPr>
-            </a:lvl4pPr>
-            <a:lvl5pPr marL="1828800" indent="0" algn="l" defTabSz="457200" rtl="0" eaLnBrk="1" latinLnBrk="0" hangingPunct="1">
-              <a:spcBef>
-                <a:spcPct val="20000"/>
-              </a:spcBef>
-              <a:buFont typeface="Arial"/>
-              <a:buNone/>
-              <a:defRPr sz="2400" kern="1200">
-                <a:solidFill>
-                  <a:schemeClr val="tx1"/>
-                </a:solidFill>
-                <a:latin typeface="+mn-lt"/>
-                <a:ea typeface="+mn-ea"/>
-                <a:cs typeface="+mn-cs"/>
-              </a:defRPr>
-            </a:lvl5pPr>
-            <a:lvl6pPr marL="2514600" indent="-228600" algn="l" defTabSz="457200" rtl="0" eaLnBrk="1" latinLnBrk="0" hangingPunct="1">
-              <a:spcBef>
-                <a:spcPct val="20000"/>
-              </a:spcBef>
-              <a:buFont typeface="Arial"/>
-              <a:buChar char="•"/>
-              <a:defRPr sz="2000" kern="1200">
-                <a:solidFill>
-                  <a:schemeClr val="tx1"/>
-                </a:solidFill>
-                <a:latin typeface="+mn-lt"/>
-                <a:ea typeface="+mn-ea"/>
-                <a:cs typeface="+mn-cs"/>
-              </a:defRPr>
-            </a:lvl6pPr>
-            <a:lvl7pPr marL="2971800" indent="-228600" algn="l" defTabSz="457200" rtl="0" eaLnBrk="1" latinLnBrk="0" hangingPunct="1">
-              <a:spcBef>
-                <a:spcPct val="20000"/>
-              </a:spcBef>
-              <a:buFont typeface="Arial"/>
-              <a:buChar char="•"/>
-              <a:defRPr sz="2000" kern="1200">
-                <a:solidFill>
-                  <a:schemeClr val="tx1"/>
-                </a:solidFill>
-                <a:latin typeface="+mn-lt"/>
-                <a:ea typeface="+mn-ea"/>
-                <a:cs typeface="+mn-cs"/>
-              </a:defRPr>
-            </a:lvl7pPr>
-            <a:lvl8pPr marL="3429000" indent="-228600" algn="l" defTabSz="457200" rtl="0" eaLnBrk="1" latinLnBrk="0" hangingPunct="1">
-              <a:spcBef>
-                <a:spcPct val="20000"/>
-              </a:spcBef>
-              <a:buFont typeface="Arial"/>
-              <a:buChar char="•"/>
-              <a:defRPr sz="2000" kern="1200">
-                <a:solidFill>
-                  <a:schemeClr val="tx1"/>
-                </a:solidFill>
-                <a:latin typeface="+mn-lt"/>
-                <a:ea typeface="+mn-ea"/>
-                <a:cs typeface="+mn-cs"/>
-              </a:defRPr>
-            </a:lvl8pPr>
-            <a:lvl9pPr marL="3886200" indent="-228600" algn="l" defTabSz="457200" rtl="0" eaLnBrk="1" latinLnBrk="0" hangingPunct="1">
-              <a:spcBef>
-                <a:spcPct val="20000"/>
-              </a:spcBef>
-              <a:buFont typeface="Arial"/>
-              <a:buChar char="•"/>
-              <a:defRPr sz="2000" kern="1200">
-                <a:solidFill>
-                  <a:schemeClr val="tx1"/>
-                </a:solidFill>
-                <a:latin typeface="+mn-lt"/>
-                <a:ea typeface="+mn-ea"/>
-                <a:cs typeface="+mn-cs"/>
-              </a:defRPr>
-            </a:lvl9pPr>
-          </a:lstStyle>
           <a:p>
             <a:pPr marL="342900" indent="-342900">
               <a:buFont typeface="Arial"/>
               <a:buChar char="•"/>
             </a:pPr>
-            <a:r>
-              <a:rPr lang="en-GB" sz="1400" dirty="0">
-                <a:latin typeface="Arial"/>
-                <a:cs typeface="Arial"/>
-              </a:rPr>
-              <a:t>Overwrite a value</a:t>
-            </a:r>
+            <a:endParaRPr lang="en-GB" sz="2000" dirty="0">
+              <a:latin typeface="Arial"/>
+              <a:cs typeface="Arial"/>
+            </a:endParaRPr>
           </a:p>
           <a:p>
             <a:pPr marL="342900" indent="-342900">
               <a:buFont typeface="Arial"/>
               <a:buChar char="•"/>
             </a:pPr>
-            <a:endParaRPr lang="en-GB" sz="1400" dirty="0">
+            <a:endParaRPr lang="en-GB" sz="2000" dirty="0">
               <a:latin typeface="Arial"/>
               <a:cs typeface="Arial"/>
             </a:endParaRPr>
@@ -34604,430 +34713,17 @@
               <a:buFont typeface="Arial"/>
               <a:buChar char="•"/>
             </a:pPr>
-            <a:endParaRPr lang="en-GB" sz="1400" dirty="0">
+            <a:endParaRPr lang="en-GB" sz="2000" dirty="0">
               <a:latin typeface="Arial"/>
               <a:cs typeface="Arial"/>
             </a:endParaRPr>
           </a:p>
-          <a:p>
-            <a:pPr marL="342900" indent="-342900">
-              <a:buFont typeface="Arial"/>
-              <a:buChar char="•"/>
-            </a:pPr>
-            <a:endParaRPr lang="en-GB" sz="1400" dirty="0">
-              <a:latin typeface="Arial"/>
-              <a:cs typeface="Arial"/>
-            </a:endParaRPr>
-          </a:p>
-          <a:p>
-            <a:pPr marL="342900" indent="-342900">
-              <a:buFont typeface="Arial"/>
-              <a:buChar char="•"/>
-            </a:pPr>
-            <a:endParaRPr lang="en-GB" sz="1400" dirty="0">
-              <a:latin typeface="Arial"/>
-              <a:cs typeface="Arial"/>
-            </a:endParaRPr>
-          </a:p>
-          <a:p>
-            <a:pPr marL="342900" indent="-342900">
-              <a:buFont typeface="Arial"/>
-              <a:buChar char="•"/>
-            </a:pPr>
-            <a:endParaRPr lang="en-GB" sz="1400" dirty="0">
-              <a:latin typeface="Arial"/>
-              <a:cs typeface="Arial"/>
-            </a:endParaRPr>
-          </a:p>
-          <a:p>
-            <a:pPr marL="342900" indent="-342900">
-              <a:buFont typeface="Arial"/>
-              <a:buChar char="•"/>
-            </a:pPr>
-            <a:endParaRPr lang="en-GB" sz="1400" dirty="0">
-              <a:latin typeface="Arial"/>
-              <a:cs typeface="Arial"/>
-            </a:endParaRPr>
-          </a:p>
-          <a:p>
-            <a:pPr marL="342900" indent="-342900">
-              <a:buFont typeface="Arial"/>
-              <a:buChar char="•"/>
-            </a:pPr>
-            <a:r>
-              <a:rPr lang="en-GB" sz="1400" dirty="0">
-                <a:latin typeface="Arial"/>
-                <a:cs typeface="Arial"/>
-              </a:rPr>
-              <a:t>Deleting an item by value is a bit tougher — we will look at doing this in the homework sheet </a:t>
-            </a:r>
-          </a:p>
-        </p:txBody>
-      </p:sp>
-      <p:sp>
-        <p:nvSpPr>
-          <p:cNvPr id="13" name="Text Placeholder 2">
-            <a:extLst>
-              <a:ext uri="{FF2B5EF4-FFF2-40B4-BE49-F238E27FC236}">
-                <a16:creationId xmlns:a16="http://schemas.microsoft.com/office/drawing/2014/main" id="{B49F9675-3016-456A-9429-C7A31BF54FAD}"/>
-              </a:ext>
-            </a:extLst>
-          </p:cNvPr>
-          <p:cNvSpPr txBox="1">
-            <a:spLocks/>
-          </p:cNvSpPr>
-          <p:nvPr/>
-        </p:nvSpPr>
-        <p:spPr>
-          <a:xfrm>
-            <a:off x="768431" y="2135825"/>
-            <a:ext cx="4168640" cy="2462457"/>
-          </a:xfrm>
-          <a:prstGeom prst="rect">
-            <a:avLst/>
-          </a:prstGeom>
-        </p:spPr>
-        <p:txBody>
-          <a:bodyPr vert="horz" anchor="t"/>
-          <a:lstStyle>
-            <a:lvl1pPr marL="0" indent="0" algn="l" defTabSz="457200" rtl="0" eaLnBrk="1" latinLnBrk="0" hangingPunct="1">
-              <a:spcBef>
-                <a:spcPts val="0"/>
-              </a:spcBef>
-              <a:buFont typeface="Arial"/>
-              <a:buNone/>
-              <a:defRPr sz="2400" kern="1200" baseline="0">
-                <a:solidFill>
-                  <a:schemeClr val="tx1"/>
-                </a:solidFill>
-                <a:latin typeface="Arial" pitchFamily="34" charset="0"/>
-                <a:ea typeface="+mn-ea"/>
-                <a:cs typeface="Arial" pitchFamily="34" charset="0"/>
-              </a:defRPr>
-            </a:lvl1pPr>
-            <a:lvl2pPr marL="457200" indent="0" algn="l" defTabSz="457200" rtl="0" eaLnBrk="1" latinLnBrk="0" hangingPunct="1">
-              <a:spcBef>
-                <a:spcPct val="20000"/>
-              </a:spcBef>
-              <a:buFont typeface="Arial"/>
-              <a:buNone/>
-              <a:defRPr sz="2400" kern="1200">
-                <a:solidFill>
-                  <a:schemeClr val="tx1"/>
-                </a:solidFill>
-                <a:latin typeface="+mn-lt"/>
-                <a:ea typeface="+mn-ea"/>
-                <a:cs typeface="+mn-cs"/>
-              </a:defRPr>
-            </a:lvl2pPr>
-            <a:lvl3pPr marL="914400" indent="0" algn="l" defTabSz="457200" rtl="0" eaLnBrk="1" latinLnBrk="0" hangingPunct="1">
-              <a:spcBef>
-                <a:spcPct val="20000"/>
-              </a:spcBef>
-              <a:buFont typeface="Arial"/>
-              <a:buNone/>
-              <a:defRPr sz="2400" kern="1200">
-                <a:solidFill>
-                  <a:schemeClr val="tx1"/>
-                </a:solidFill>
-                <a:latin typeface="+mn-lt"/>
-                <a:ea typeface="+mn-ea"/>
-                <a:cs typeface="+mn-cs"/>
-              </a:defRPr>
-            </a:lvl3pPr>
-            <a:lvl4pPr marL="1371600" indent="0" algn="l" defTabSz="457200" rtl="0" eaLnBrk="1" latinLnBrk="0" hangingPunct="1">
-              <a:spcBef>
-                <a:spcPct val="20000"/>
-              </a:spcBef>
-              <a:buFont typeface="Arial"/>
-              <a:buNone/>
-              <a:defRPr sz="2400" kern="1200">
-                <a:solidFill>
-                  <a:schemeClr val="tx1"/>
-                </a:solidFill>
-                <a:latin typeface="+mn-lt"/>
-                <a:ea typeface="+mn-ea"/>
-                <a:cs typeface="+mn-cs"/>
-              </a:defRPr>
-            </a:lvl4pPr>
-            <a:lvl5pPr marL="1828800" indent="0" algn="l" defTabSz="457200" rtl="0" eaLnBrk="1" latinLnBrk="0" hangingPunct="1">
-              <a:spcBef>
-                <a:spcPct val="20000"/>
-              </a:spcBef>
-              <a:buFont typeface="Arial"/>
-              <a:buNone/>
-              <a:defRPr sz="2400" kern="1200">
-                <a:solidFill>
-                  <a:schemeClr val="tx1"/>
-                </a:solidFill>
-                <a:latin typeface="+mn-lt"/>
-                <a:ea typeface="+mn-ea"/>
-                <a:cs typeface="+mn-cs"/>
-              </a:defRPr>
-            </a:lvl5pPr>
-            <a:lvl6pPr marL="2514600" indent="-228600" algn="l" defTabSz="457200" rtl="0" eaLnBrk="1" latinLnBrk="0" hangingPunct="1">
-              <a:spcBef>
-                <a:spcPct val="20000"/>
-              </a:spcBef>
-              <a:buFont typeface="Arial"/>
-              <a:buChar char="•"/>
-              <a:defRPr sz="2000" kern="1200">
-                <a:solidFill>
-                  <a:schemeClr val="tx1"/>
-                </a:solidFill>
-                <a:latin typeface="+mn-lt"/>
-                <a:ea typeface="+mn-ea"/>
-                <a:cs typeface="+mn-cs"/>
-              </a:defRPr>
-            </a:lvl6pPr>
-            <a:lvl7pPr marL="2971800" indent="-228600" algn="l" defTabSz="457200" rtl="0" eaLnBrk="1" latinLnBrk="0" hangingPunct="1">
-              <a:spcBef>
-                <a:spcPct val="20000"/>
-              </a:spcBef>
-              <a:buFont typeface="Arial"/>
-              <a:buChar char="•"/>
-              <a:defRPr sz="2000" kern="1200">
-                <a:solidFill>
-                  <a:schemeClr val="tx1"/>
-                </a:solidFill>
-                <a:latin typeface="+mn-lt"/>
-                <a:ea typeface="+mn-ea"/>
-                <a:cs typeface="+mn-cs"/>
-              </a:defRPr>
-            </a:lvl7pPr>
-            <a:lvl8pPr marL="3429000" indent="-228600" algn="l" defTabSz="457200" rtl="0" eaLnBrk="1" latinLnBrk="0" hangingPunct="1">
-              <a:spcBef>
-                <a:spcPct val="20000"/>
-              </a:spcBef>
-              <a:buFont typeface="Arial"/>
-              <a:buChar char="•"/>
-              <a:defRPr sz="2000" kern="1200">
-                <a:solidFill>
-                  <a:schemeClr val="tx1"/>
-                </a:solidFill>
-                <a:latin typeface="+mn-lt"/>
-                <a:ea typeface="+mn-ea"/>
-                <a:cs typeface="+mn-cs"/>
-              </a:defRPr>
-            </a:lvl8pPr>
-            <a:lvl9pPr marL="3886200" indent="-228600" algn="l" defTabSz="457200" rtl="0" eaLnBrk="1" latinLnBrk="0" hangingPunct="1">
-              <a:spcBef>
-                <a:spcPct val="20000"/>
-              </a:spcBef>
-              <a:buFont typeface="Arial"/>
-              <a:buChar char="•"/>
-              <a:defRPr sz="2000" kern="1200">
-                <a:solidFill>
-                  <a:schemeClr val="tx1"/>
-                </a:solidFill>
-                <a:latin typeface="+mn-lt"/>
-                <a:ea typeface="+mn-ea"/>
-                <a:cs typeface="+mn-cs"/>
-              </a:defRPr>
-            </a:lvl9pPr>
-          </a:lstStyle>
-          <a:p>
-            <a:pPr marL="342900" indent="-342900">
-              <a:buFont typeface="Arial"/>
-              <a:buChar char="•"/>
-            </a:pPr>
-            <a:r>
-              <a:rPr lang="en-GB" sz="1400" dirty="0">
-                <a:latin typeface="Arial"/>
-                <a:cs typeface="Arial"/>
-              </a:rPr>
-              <a:t>Add a new item</a:t>
-            </a:r>
-          </a:p>
-          <a:p>
-            <a:pPr marL="342900" indent="-342900">
-              <a:buFont typeface="Arial"/>
-              <a:buChar char="•"/>
-            </a:pPr>
-            <a:endParaRPr lang="en-GB" sz="1400" dirty="0">
-              <a:latin typeface="Arial"/>
-              <a:cs typeface="Arial"/>
-            </a:endParaRPr>
-          </a:p>
-          <a:p>
-            <a:pPr marL="342900" indent="-342900">
-              <a:buFont typeface="Arial"/>
-              <a:buChar char="•"/>
-            </a:pPr>
-            <a:endParaRPr lang="en-GB" sz="1400" dirty="0">
-              <a:latin typeface="Arial"/>
-              <a:cs typeface="Arial"/>
-            </a:endParaRPr>
-          </a:p>
-          <a:p>
-            <a:pPr marL="342900" indent="-342900">
-              <a:buFont typeface="Arial"/>
-              <a:buChar char="•"/>
-            </a:pPr>
-            <a:endParaRPr lang="en-GB" sz="1400" dirty="0">
-              <a:latin typeface="Arial"/>
-              <a:cs typeface="Arial"/>
-            </a:endParaRPr>
-          </a:p>
-          <a:p>
-            <a:pPr marL="342900" indent="-342900">
-              <a:buFont typeface="Arial"/>
-              <a:buChar char="•"/>
-            </a:pPr>
-            <a:endParaRPr lang="en-GB" sz="1400" dirty="0">
-              <a:latin typeface="Arial"/>
-              <a:cs typeface="Arial"/>
-            </a:endParaRPr>
-          </a:p>
-          <a:p>
-            <a:pPr marL="342900" indent="-342900">
-              <a:buFont typeface="Arial"/>
-              <a:buChar char="•"/>
-            </a:pPr>
-            <a:endParaRPr lang="en-GB" sz="1400" dirty="0">
-              <a:latin typeface="Arial"/>
-              <a:cs typeface="Arial"/>
-            </a:endParaRPr>
-          </a:p>
-          <a:p>
-            <a:pPr marL="342900" indent="-342900">
-              <a:buFont typeface="Arial"/>
-              <a:buChar char="•"/>
-            </a:pPr>
-            <a:r>
-              <a:rPr lang="en-GB" sz="1400" dirty="0">
-                <a:latin typeface="Arial"/>
-                <a:cs typeface="Arial"/>
-              </a:rPr>
-              <a:t>Delete an item by key</a:t>
-            </a:r>
-          </a:p>
-        </p:txBody>
-      </p:sp>
-      <p:pic>
-        <p:nvPicPr>
-          <p:cNvPr id="4" name="Picture 3">
-            <a:extLst>
-              <a:ext uri="{FF2B5EF4-FFF2-40B4-BE49-F238E27FC236}">
-                <a16:creationId xmlns:a16="http://schemas.microsoft.com/office/drawing/2014/main" id="{3FD2770E-8D78-4B1F-95E7-D3596376F277}"/>
-              </a:ext>
-            </a:extLst>
-          </p:cNvPr>
-          <p:cNvPicPr>
-            <a:picLocks noChangeAspect="1"/>
-          </p:cNvPicPr>
-          <p:nvPr/>
-        </p:nvPicPr>
-        <p:blipFill>
-          <a:blip r:embed="rId4"/>
-          <a:stretch>
-            <a:fillRect/>
-          </a:stretch>
-        </p:blipFill>
-        <p:spPr>
-          <a:xfrm>
-            <a:off x="2464566" y="1357637"/>
-            <a:ext cx="4168641" cy="483464"/>
-          </a:xfrm>
-          <a:prstGeom prst="rect">
-            <a:avLst/>
-          </a:prstGeom>
-        </p:spPr>
-      </p:pic>
-      <p:pic>
-        <p:nvPicPr>
-          <p:cNvPr id="7" name="Picture 6">
-            <a:extLst>
-              <a:ext uri="{FF2B5EF4-FFF2-40B4-BE49-F238E27FC236}">
-                <a16:creationId xmlns:a16="http://schemas.microsoft.com/office/drawing/2014/main" id="{F5333401-0C60-40D7-BA94-AD1ECB9122A2}"/>
-              </a:ext>
-            </a:extLst>
-          </p:cNvPr>
-          <p:cNvPicPr>
-            <a:picLocks noChangeAspect="1"/>
-          </p:cNvPicPr>
-          <p:nvPr/>
-        </p:nvPicPr>
-        <p:blipFill>
-          <a:blip r:embed="rId5"/>
-          <a:stretch>
-            <a:fillRect/>
-          </a:stretch>
-        </p:blipFill>
-        <p:spPr>
-          <a:xfrm>
-            <a:off x="1378214" y="2510165"/>
-            <a:ext cx="2583093" cy="826198"/>
-          </a:xfrm>
-          <a:prstGeom prst="rect">
-            <a:avLst/>
-          </a:prstGeom>
-        </p:spPr>
-      </p:pic>
-      <p:pic>
-        <p:nvPicPr>
-          <p:cNvPr id="8" name="Picture 7">
-            <a:extLst>
-              <a:ext uri="{FF2B5EF4-FFF2-40B4-BE49-F238E27FC236}">
-                <a16:creationId xmlns:a16="http://schemas.microsoft.com/office/drawing/2014/main" id="{7F16399D-6BA8-46E9-901C-BFEE279AA2B4}"/>
-              </a:ext>
-            </a:extLst>
-          </p:cNvPr>
-          <p:cNvPicPr>
-            <a:picLocks noChangeAspect="1"/>
-          </p:cNvPicPr>
-          <p:nvPr/>
-        </p:nvPicPr>
-        <p:blipFill>
-          <a:blip r:embed="rId6"/>
-          <a:stretch>
-            <a:fillRect/>
-          </a:stretch>
-        </p:blipFill>
-        <p:spPr>
-          <a:xfrm>
-            <a:off x="1378214" y="3773724"/>
-            <a:ext cx="1443805" cy="824558"/>
-          </a:xfrm>
-          <a:prstGeom prst="rect">
-            <a:avLst/>
-          </a:prstGeom>
-        </p:spPr>
-      </p:pic>
-      <p:pic>
-        <p:nvPicPr>
-          <p:cNvPr id="14" name="Picture 13">
-            <a:extLst>
-              <a:ext uri="{FF2B5EF4-FFF2-40B4-BE49-F238E27FC236}">
-                <a16:creationId xmlns:a16="http://schemas.microsoft.com/office/drawing/2014/main" id="{38ECDF29-E276-45DD-8EFC-6CF0BF453A19}"/>
-              </a:ext>
-            </a:extLst>
-          </p:cNvPr>
-          <p:cNvPicPr>
-            <a:picLocks noChangeAspect="1"/>
-          </p:cNvPicPr>
-          <p:nvPr/>
-        </p:nvPicPr>
-        <p:blipFill>
-          <a:blip r:embed="rId7"/>
-          <a:stretch>
-            <a:fillRect/>
-          </a:stretch>
-        </p:blipFill>
-        <p:spPr>
-          <a:xfrm>
-            <a:off x="5262608" y="2510165"/>
-            <a:ext cx="2928304" cy="751081"/>
-          </a:xfrm>
-          <a:prstGeom prst="rect">
-            <a:avLst/>
-          </a:prstGeom>
-        </p:spPr>
-      </p:pic>
+        </p:txBody>
+      </p:sp>
     </p:spTree>
     <p:extLst>
       <p:ext uri="{BB962C8B-B14F-4D97-AF65-F5344CB8AC3E}">
-        <p14:creationId xmlns:p14="http://schemas.microsoft.com/office/powerpoint/2010/main" val="950536162"/>
+        <p14:creationId xmlns:p14="http://schemas.microsoft.com/office/powerpoint/2010/main" val="756925942"/>
       </p:ext>
     </p:extLst>
   </p:cSld>
@@ -37033,7 +36729,11 @@
 
 <file path=customXml/item1.xml><?xml version="1.0" encoding="utf-8"?>
 <?mso-contentType ?>
-<SharedContentType xmlns="Microsoft.SharePoint.Taxonomy.ContentTypeSync" SourceId="1ee89e71-04cd-405e-9ca3-99e020c1694d" ContentTypeId="0x0101" PreviousValue="false"/>
+<FormTemplates xmlns="http://schemas.microsoft.com/sharepoint/v3/contenttype/forms">
+  <Display>DocumentLibraryForm</Display>
+  <Edit>DocumentLibraryForm</Edit>
+  <New>DocumentLibraryForm</New>
+</FormTemplates>
 </file>
 
 <file path=customXml/item2.xml><?xml version="1.0" encoding="utf-8"?>
@@ -37217,11 +36917,7 @@
 
 <file path=customXml/item3.xml><?xml version="1.0" encoding="utf-8"?>
 <?mso-contentType ?>
-<FormTemplates xmlns="http://schemas.microsoft.com/sharepoint/v3/contenttype/forms">
-  <Display>DocumentLibraryForm</Display>
-  <Edit>DocumentLibraryForm</Edit>
-  <New>DocumentLibraryForm</New>
-</FormTemplates>
+<SharedContentType xmlns="Microsoft.SharePoint.Taxonomy.ContentTypeSync" SourceId="1ee89e71-04cd-405e-9ca3-99e020c1694d" ContentTypeId="0x0101" PreviousValue="false"/>
 </file>
 
 <file path=customXml/item4.xml><?xml version="1.0" encoding="utf-8"?>
@@ -37234,9 +36930,9 @@
 </file>
 
 <file path=customXml/itemProps1.xml><?xml version="1.0" encoding="utf-8"?>
-<ds:datastoreItem xmlns:ds="http://schemas.openxmlformats.org/officeDocument/2006/customXml" ds:itemID="{91989A13-6EBC-4BFF-A25C-E4D3CAAA08AF}">
+<ds:datastoreItem xmlns:ds="http://schemas.openxmlformats.org/officeDocument/2006/customXml" ds:itemID="{BEBDFA33-3959-412D-BF65-F572B77FF4EC}">
   <ds:schemaRefs>
-    <ds:schemaRef ds:uri="Microsoft.SharePoint.Taxonomy.ContentTypeSync"/>
+    <ds:schemaRef ds:uri="http://schemas.microsoft.com/sharepoint/v3/contenttype/forms"/>
   </ds:schemaRefs>
 </ds:datastoreItem>
 </file>
@@ -37261,9 +36957,9 @@
 </file>
 
 <file path=customXml/itemProps3.xml><?xml version="1.0" encoding="utf-8"?>
-<ds:datastoreItem xmlns:ds="http://schemas.openxmlformats.org/officeDocument/2006/customXml" ds:itemID="{BEBDFA33-3959-412D-BF65-F572B77FF4EC}">
+<ds:datastoreItem xmlns:ds="http://schemas.openxmlformats.org/officeDocument/2006/customXml" ds:itemID="{91989A13-6EBC-4BFF-A25C-E4D3CAAA08AF}">
   <ds:schemaRefs>
-    <ds:schemaRef ds:uri="http://schemas.microsoft.com/sharepoint/v3/contenttype/forms"/>
+    <ds:schemaRef ds:uri="Microsoft.SharePoint.Taxonomy.ContentTypeSync"/>
   </ds:schemaRefs>
 </ds:datastoreItem>
 </file>

</xml_diff>